<commit_message>
03/27 MSA GATEWAY, EUREKA SERVER
</commit_message>
<xml_diff>
--- a/_PPT/JPA.pptx
+++ b/_PPT/JPA.pptx
@@ -6,10 +6,28 @@
   </p:sldMasterIdLst>
   <p:sldIdLst>
     <p:sldId id="256" r:id="rId2"/>
-    <p:sldId id="257" r:id="rId3"/>
-    <p:sldId id="258" r:id="rId4"/>
-    <p:sldId id="259" r:id="rId5"/>
-    <p:sldId id="260" r:id="rId6"/>
+    <p:sldId id="261" r:id="rId3"/>
+    <p:sldId id="257" r:id="rId4"/>
+    <p:sldId id="258" r:id="rId5"/>
+    <p:sldId id="259" r:id="rId6"/>
+    <p:sldId id="260" r:id="rId7"/>
+    <p:sldId id="262" r:id="rId8"/>
+    <p:sldId id="267" r:id="rId9"/>
+    <p:sldId id="268" r:id="rId10"/>
+    <p:sldId id="269" r:id="rId11"/>
+    <p:sldId id="270" r:id="rId12"/>
+    <p:sldId id="271" r:id="rId13"/>
+    <p:sldId id="272" r:id="rId14"/>
+    <p:sldId id="273" r:id="rId15"/>
+    <p:sldId id="274" r:id="rId16"/>
+    <p:sldId id="275" r:id="rId17"/>
+    <p:sldId id="276" r:id="rId18"/>
+    <p:sldId id="277" r:id="rId19"/>
+    <p:sldId id="278" r:id="rId20"/>
+    <p:sldId id="263" r:id="rId21"/>
+    <p:sldId id="264" r:id="rId22"/>
+    <p:sldId id="265" r:id="rId23"/>
+    <p:sldId id="266" r:id="rId24"/>
   </p:sldIdLst>
   <p:sldSz cx="12192000" cy="6858000"/>
   <p:notesSz cx="6858000" cy="9144000"/>
@@ -247,7 +265,7 @@
           <a:p>
             <a:fld id="{524ADC9C-81C8-4AE5-ABD8-20EA6C1347F0}" type="datetimeFigureOut">
               <a:rPr lang="ko-KR" altLang="en-US" smtClean="0"/>
-              <a:t>2025-03-20</a:t>
+              <a:t>2025-03-24</a:t>
             </a:fld>
             <a:endParaRPr lang="ko-KR" altLang="en-US"/>
           </a:p>
@@ -417,7 +435,7 @@
           <a:p>
             <a:fld id="{524ADC9C-81C8-4AE5-ABD8-20EA6C1347F0}" type="datetimeFigureOut">
               <a:rPr lang="ko-KR" altLang="en-US" smtClean="0"/>
-              <a:t>2025-03-20</a:t>
+              <a:t>2025-03-24</a:t>
             </a:fld>
             <a:endParaRPr lang="ko-KR" altLang="en-US"/>
           </a:p>
@@ -597,7 +615,7 @@
           <a:p>
             <a:fld id="{524ADC9C-81C8-4AE5-ABD8-20EA6C1347F0}" type="datetimeFigureOut">
               <a:rPr lang="ko-KR" altLang="en-US" smtClean="0"/>
-              <a:t>2025-03-20</a:t>
+              <a:t>2025-03-24</a:t>
             </a:fld>
             <a:endParaRPr lang="ko-KR" altLang="en-US"/>
           </a:p>
@@ -767,7 +785,7 @@
           <a:p>
             <a:fld id="{524ADC9C-81C8-4AE5-ABD8-20EA6C1347F0}" type="datetimeFigureOut">
               <a:rPr lang="ko-KR" altLang="en-US" smtClean="0"/>
-              <a:t>2025-03-20</a:t>
+              <a:t>2025-03-24</a:t>
             </a:fld>
             <a:endParaRPr lang="ko-KR" altLang="en-US"/>
           </a:p>
@@ -1013,7 +1031,7 @@
           <a:p>
             <a:fld id="{524ADC9C-81C8-4AE5-ABD8-20EA6C1347F0}" type="datetimeFigureOut">
               <a:rPr lang="ko-KR" altLang="en-US" smtClean="0"/>
-              <a:t>2025-03-20</a:t>
+              <a:t>2025-03-24</a:t>
             </a:fld>
             <a:endParaRPr lang="ko-KR" altLang="en-US"/>
           </a:p>
@@ -1245,7 +1263,7 @@
           <a:p>
             <a:fld id="{524ADC9C-81C8-4AE5-ABD8-20EA6C1347F0}" type="datetimeFigureOut">
               <a:rPr lang="ko-KR" altLang="en-US" smtClean="0"/>
-              <a:t>2025-03-20</a:t>
+              <a:t>2025-03-24</a:t>
             </a:fld>
             <a:endParaRPr lang="ko-KR" altLang="en-US"/>
           </a:p>
@@ -1612,7 +1630,7 @@
           <a:p>
             <a:fld id="{524ADC9C-81C8-4AE5-ABD8-20EA6C1347F0}" type="datetimeFigureOut">
               <a:rPr lang="ko-KR" altLang="en-US" smtClean="0"/>
-              <a:t>2025-03-20</a:t>
+              <a:t>2025-03-24</a:t>
             </a:fld>
             <a:endParaRPr lang="ko-KR" altLang="en-US"/>
           </a:p>
@@ -1730,7 +1748,7 @@
           <a:p>
             <a:fld id="{524ADC9C-81C8-4AE5-ABD8-20EA6C1347F0}" type="datetimeFigureOut">
               <a:rPr lang="ko-KR" altLang="en-US" smtClean="0"/>
-              <a:t>2025-03-20</a:t>
+              <a:t>2025-03-24</a:t>
             </a:fld>
             <a:endParaRPr lang="ko-KR" altLang="en-US"/>
           </a:p>
@@ -1825,7 +1843,7 @@
           <a:p>
             <a:fld id="{524ADC9C-81C8-4AE5-ABD8-20EA6C1347F0}" type="datetimeFigureOut">
               <a:rPr lang="ko-KR" altLang="en-US" smtClean="0"/>
-              <a:t>2025-03-20</a:t>
+              <a:t>2025-03-24</a:t>
             </a:fld>
             <a:endParaRPr lang="ko-KR" altLang="en-US"/>
           </a:p>
@@ -2102,7 +2120,7 @@
           <a:p>
             <a:fld id="{524ADC9C-81C8-4AE5-ABD8-20EA6C1347F0}" type="datetimeFigureOut">
               <a:rPr lang="ko-KR" altLang="en-US" smtClean="0"/>
-              <a:t>2025-03-20</a:t>
+              <a:t>2025-03-24</a:t>
             </a:fld>
             <a:endParaRPr lang="ko-KR" altLang="en-US"/>
           </a:p>
@@ -2355,7 +2373,7 @@
           <a:p>
             <a:fld id="{524ADC9C-81C8-4AE5-ABD8-20EA6C1347F0}" type="datetimeFigureOut">
               <a:rPr lang="ko-KR" altLang="en-US" smtClean="0"/>
-              <a:t>2025-03-20</a:t>
+              <a:t>2025-03-24</a:t>
             </a:fld>
             <a:endParaRPr lang="ko-KR" altLang="en-US"/>
           </a:p>
@@ -2568,7 +2586,7 @@
           <a:p>
             <a:fld id="{524ADC9C-81C8-4AE5-ABD8-20EA6C1347F0}" type="datetimeFigureOut">
               <a:rPr lang="ko-KR" altLang="en-US" smtClean="0"/>
-              <a:t>2025-03-20</a:t>
+              <a:t>2025-03-24</a:t>
             </a:fld>
             <a:endParaRPr lang="ko-KR" altLang="en-US"/>
           </a:p>
@@ -3083,6 +3101,1809 @@
 </p:sld>
 </file>
 
+<file path=ppt/slides/slide10.xml><?xml version="1.0" encoding="utf-8"?>
+<p:sld xmlns:a="http://schemas.openxmlformats.org/drawingml/2006/main" xmlns:r="http://schemas.openxmlformats.org/officeDocument/2006/relationships" xmlns:p="http://schemas.openxmlformats.org/presentationml/2006/main">
+  <p:cSld>
+    <p:spTree>
+      <p:nvGrpSpPr>
+        <p:cNvPr id="1" name=""/>
+        <p:cNvGrpSpPr/>
+        <p:nvPr/>
+      </p:nvGrpSpPr>
+      <p:grpSpPr>
+        <a:xfrm>
+          <a:off x="0" y="0"/>
+          <a:ext cx="0" cy="0"/>
+          <a:chOff x="0" y="0"/>
+          <a:chExt cx="0" cy="0"/>
+        </a:xfrm>
+      </p:grpSpPr>
+      <p:sp>
+        <p:nvSpPr>
+          <p:cNvPr id="2" name="제목 1"/>
+          <p:cNvSpPr>
+            <a:spLocks noGrp="1"/>
+          </p:cNvSpPr>
+          <p:nvPr>
+            <p:ph type="title"/>
+          </p:nvPr>
+        </p:nvSpPr>
+        <p:spPr/>
+        <p:txBody>
+          <a:bodyPr>
+            <a:normAutofit fontScale="90000"/>
+          </a:bodyPr>
+          <a:lstStyle/>
+          <a:p>
+            <a:pPr>
+              <a:lnSpc>
+                <a:spcPct val="150000"/>
+              </a:lnSpc>
+            </a:pPr>
+            <a:r>
+              <a:rPr lang="en-US" altLang="ko-KR" dirty="0"/>
+              <a:t>@Query </a:t>
+            </a:r>
+            <a:r>
+              <a:rPr lang="ko-KR" altLang="en-US" dirty="0" smtClean="0"/>
+              <a:t>예</a:t>
+            </a:r>
+            <a:r>
+              <a:rPr lang="en-US" altLang="ko-KR" dirty="0" smtClean="0"/>
+              <a:t>: </a:t>
+            </a:r>
+            <a:r>
+              <a:rPr lang="ko-KR" altLang="en-US" dirty="0" smtClean="0"/>
+              <a:t>이름에 </a:t>
+            </a:r>
+            <a:r>
+              <a:rPr lang="ko-KR" altLang="en-US" dirty="0"/>
+              <a:t>특정 키워드가 포함된 회원 검색하는 </a:t>
+            </a:r>
+            <a:r>
+              <a:rPr lang="ko-KR" altLang="en-US" dirty="0" smtClean="0"/>
+              <a:t>경우</a:t>
+            </a:r>
+            <a:endParaRPr lang="ko-KR" altLang="en-US" dirty="0"/>
+          </a:p>
+        </p:txBody>
+      </p:sp>
+      <p:pic>
+        <p:nvPicPr>
+          <p:cNvPr id="4" name="내용 개체 틀 3"/>
+          <p:cNvPicPr>
+            <a:picLocks noGrp="1" noChangeAspect="1"/>
+          </p:cNvPicPr>
+          <p:nvPr>
+            <p:ph idx="1"/>
+          </p:nvPr>
+        </p:nvPicPr>
+        <p:blipFill>
+          <a:blip r:embed="rId2"/>
+          <a:stretch>
+            <a:fillRect/>
+          </a:stretch>
+        </p:blipFill>
+        <p:spPr>
+          <a:xfrm>
+            <a:off x="1178300" y="2796989"/>
+            <a:ext cx="9835399" cy="1689039"/>
+          </a:xfrm>
+          <a:prstGeom prst="rect">
+            <a:avLst/>
+          </a:prstGeom>
+        </p:spPr>
+      </p:pic>
+    </p:spTree>
+    <p:extLst>
+      <p:ext uri="{BB962C8B-B14F-4D97-AF65-F5344CB8AC3E}">
+        <p14:creationId xmlns:p14="http://schemas.microsoft.com/office/powerpoint/2010/main" val="1698425564"/>
+      </p:ext>
+    </p:extLst>
+  </p:cSld>
+  <p:clrMapOvr>
+    <a:masterClrMapping/>
+  </p:clrMapOvr>
+  <p:timing>
+    <p:tnLst>
+      <p:par>
+        <p:cTn id="1" dur="indefinite" restart="never" nodeType="tmRoot"/>
+      </p:par>
+    </p:tnLst>
+  </p:timing>
+</p:sld>
+</file>
+
+<file path=ppt/slides/slide11.xml><?xml version="1.0" encoding="utf-8"?>
+<p:sld xmlns:a="http://schemas.openxmlformats.org/drawingml/2006/main" xmlns:r="http://schemas.openxmlformats.org/officeDocument/2006/relationships" xmlns:p="http://schemas.openxmlformats.org/presentationml/2006/main">
+  <p:cSld>
+    <p:spTree>
+      <p:nvGrpSpPr>
+        <p:cNvPr id="1" name=""/>
+        <p:cNvGrpSpPr/>
+        <p:nvPr/>
+      </p:nvGrpSpPr>
+      <p:grpSpPr>
+        <a:xfrm>
+          <a:off x="0" y="0"/>
+          <a:ext cx="0" cy="0"/>
+          <a:chOff x="0" y="0"/>
+          <a:chExt cx="0" cy="0"/>
+        </a:xfrm>
+      </p:grpSpPr>
+      <p:sp>
+        <p:nvSpPr>
+          <p:cNvPr id="2" name="제목 1"/>
+          <p:cNvSpPr>
+            <a:spLocks noGrp="1"/>
+          </p:cNvSpPr>
+          <p:nvPr>
+            <p:ph type="title"/>
+          </p:nvPr>
+        </p:nvSpPr>
+        <p:spPr/>
+        <p:txBody>
+          <a:bodyPr/>
+          <a:lstStyle/>
+          <a:p>
+            <a:r>
+              <a:rPr lang="en-US" altLang="ko-KR" dirty="0"/>
+              <a:t>2</a:t>
+            </a:r>
+            <a:r>
+              <a:rPr lang="ko-KR" altLang="en-US" dirty="0"/>
+              <a:t>개 이상의 조건을 가진 쿼리일 경우</a:t>
+            </a:r>
+          </a:p>
+        </p:txBody>
+      </p:sp>
+      <p:pic>
+        <p:nvPicPr>
+          <p:cNvPr id="4" name="내용 개체 틀 3"/>
+          <p:cNvPicPr>
+            <a:picLocks noGrp="1" noChangeAspect="1"/>
+          </p:cNvPicPr>
+          <p:nvPr>
+            <p:ph idx="1"/>
+          </p:nvPr>
+        </p:nvPicPr>
+        <p:blipFill>
+          <a:blip r:embed="rId2"/>
+          <a:stretch>
+            <a:fillRect/>
+          </a:stretch>
+        </p:blipFill>
+        <p:spPr>
+          <a:xfrm>
+            <a:off x="670293" y="2827394"/>
+            <a:ext cx="10851414" cy="1359124"/>
+          </a:xfrm>
+          <a:prstGeom prst="rect">
+            <a:avLst/>
+          </a:prstGeom>
+        </p:spPr>
+      </p:pic>
+    </p:spTree>
+    <p:extLst>
+      <p:ext uri="{BB962C8B-B14F-4D97-AF65-F5344CB8AC3E}">
+        <p14:creationId xmlns:p14="http://schemas.microsoft.com/office/powerpoint/2010/main" val="351684134"/>
+      </p:ext>
+    </p:extLst>
+  </p:cSld>
+  <p:clrMapOvr>
+    <a:masterClrMapping/>
+  </p:clrMapOvr>
+  <p:timing>
+    <p:tnLst>
+      <p:par>
+        <p:cTn id="1" dur="indefinite" restart="never" nodeType="tmRoot"/>
+      </p:par>
+    </p:tnLst>
+  </p:timing>
+</p:sld>
+</file>
+
+<file path=ppt/slides/slide12.xml><?xml version="1.0" encoding="utf-8"?>
+<p:sld xmlns:a="http://schemas.openxmlformats.org/drawingml/2006/main" xmlns:r="http://schemas.openxmlformats.org/officeDocument/2006/relationships" xmlns:p="http://schemas.openxmlformats.org/presentationml/2006/main">
+  <p:cSld>
+    <p:spTree>
+      <p:nvGrpSpPr>
+        <p:cNvPr id="1" name=""/>
+        <p:cNvGrpSpPr/>
+        <p:nvPr/>
+      </p:nvGrpSpPr>
+      <p:grpSpPr>
+        <a:xfrm>
+          <a:off x="0" y="0"/>
+          <a:ext cx="0" cy="0"/>
+          <a:chOff x="0" y="0"/>
+          <a:chExt cx="0" cy="0"/>
+        </a:xfrm>
+      </p:grpSpPr>
+      <p:sp>
+        <p:nvSpPr>
+          <p:cNvPr id="2" name="제목 1"/>
+          <p:cNvSpPr>
+            <a:spLocks noGrp="1"/>
+          </p:cNvSpPr>
+          <p:nvPr>
+            <p:ph type="title"/>
+          </p:nvPr>
+        </p:nvSpPr>
+        <p:spPr/>
+        <p:txBody>
+          <a:bodyPr/>
+          <a:lstStyle/>
+          <a:p>
+            <a:r>
+              <a:rPr lang="ko-KR" altLang="en-US" dirty="0"/>
+              <a:t>쿼리 방식 </a:t>
+            </a:r>
+            <a:r>
+              <a:rPr lang="ko-KR" altLang="en-US" dirty="0" smtClean="0"/>
+              <a:t>비교</a:t>
+            </a:r>
+            <a:r>
+              <a:rPr lang="en-US" altLang="ko-KR" dirty="0" smtClean="0"/>
+              <a:t>1</a:t>
+            </a:r>
+            <a:endParaRPr lang="ko-KR" altLang="en-US" dirty="0"/>
+          </a:p>
+        </p:txBody>
+      </p:sp>
+      <p:sp>
+        <p:nvSpPr>
+          <p:cNvPr id="3" name="내용 개체 틀 2"/>
+          <p:cNvSpPr>
+            <a:spLocks noGrp="1"/>
+          </p:cNvSpPr>
+          <p:nvPr>
+            <p:ph idx="1"/>
+          </p:nvPr>
+        </p:nvSpPr>
+        <p:spPr/>
+        <p:txBody>
+          <a:bodyPr/>
+          <a:lstStyle/>
+          <a:p>
+            <a:pPr>
+              <a:lnSpc>
+                <a:spcPct val="200000"/>
+              </a:lnSpc>
+            </a:pPr>
+            <a:r>
+              <a:rPr lang="en-US" altLang="ko-KR" dirty="0"/>
+              <a:t>JPQL (Java Persistence Query Language</a:t>
+            </a:r>
+            <a:r>
+              <a:rPr lang="en-US" altLang="ko-KR" dirty="0" smtClean="0"/>
+              <a:t>)</a:t>
+            </a:r>
+          </a:p>
+          <a:p>
+            <a:pPr lvl="1">
+              <a:lnSpc>
+                <a:spcPct val="200000"/>
+              </a:lnSpc>
+            </a:pPr>
+            <a:r>
+              <a:rPr lang="ko-KR" altLang="en-US" dirty="0" err="1" smtClean="0"/>
+              <a:t>엔티티</a:t>
+            </a:r>
+            <a:r>
+              <a:rPr lang="ko-KR" altLang="en-US" dirty="0" smtClean="0"/>
+              <a:t> </a:t>
+            </a:r>
+            <a:r>
+              <a:rPr lang="ko-KR" altLang="en-US" dirty="0"/>
+              <a:t>기준으로 </a:t>
+            </a:r>
+            <a:r>
+              <a:rPr lang="en-US" altLang="ko-KR" dirty="0"/>
+              <a:t>SQL</a:t>
+            </a:r>
+            <a:r>
+              <a:rPr lang="ko-KR" altLang="en-US" dirty="0"/>
+              <a:t>과 비슷한 쿼리 </a:t>
+            </a:r>
+            <a:r>
+              <a:rPr lang="ko-KR" altLang="en-US" dirty="0" smtClean="0"/>
+              <a:t>작성</a:t>
+            </a:r>
+            <a:endParaRPr lang="en-US" altLang="ko-KR" dirty="0" smtClean="0"/>
+          </a:p>
+          <a:p>
+            <a:pPr lvl="1">
+              <a:lnSpc>
+                <a:spcPct val="200000"/>
+              </a:lnSpc>
+            </a:pPr>
+            <a:r>
+              <a:rPr lang="en-US" altLang="ko-KR" dirty="0" smtClean="0"/>
+              <a:t>@</a:t>
+            </a:r>
+            <a:r>
+              <a:rPr lang="en-US" altLang="ko-KR" dirty="0"/>
+              <a:t>Query("SELECT u FROM Users u WHERE u.name = :name</a:t>
+            </a:r>
+            <a:r>
+              <a:rPr lang="en-US" altLang="ko-KR" dirty="0" smtClean="0"/>
+              <a:t>")</a:t>
+            </a:r>
+          </a:p>
+          <a:p>
+            <a:pPr lvl="1">
+              <a:lnSpc>
+                <a:spcPct val="200000"/>
+              </a:lnSpc>
+            </a:pPr>
+            <a:r>
+              <a:rPr lang="ko-KR" altLang="en-US" dirty="0" smtClean="0"/>
+              <a:t>데이터베이스 </a:t>
+            </a:r>
+            <a:r>
+              <a:rPr lang="ko-KR" altLang="en-US" dirty="0"/>
+              <a:t>독립적</a:t>
+            </a:r>
+            <a:r>
+              <a:rPr lang="en-US" altLang="ko-KR" dirty="0"/>
+              <a:t>, SQL</a:t>
+            </a:r>
+            <a:r>
+              <a:rPr lang="ko-KR" altLang="en-US" dirty="0"/>
+              <a:t>과 </a:t>
+            </a:r>
+            <a:r>
+              <a:rPr lang="ko-KR" altLang="en-US" dirty="0" smtClean="0"/>
+              <a:t>유사</a:t>
+            </a:r>
+            <a:endParaRPr lang="en-US" altLang="ko-KR" dirty="0" smtClean="0"/>
+          </a:p>
+          <a:p>
+            <a:pPr lvl="1">
+              <a:lnSpc>
+                <a:spcPct val="200000"/>
+              </a:lnSpc>
+            </a:pPr>
+            <a:r>
+              <a:rPr lang="ko-KR" altLang="en-US" dirty="0" smtClean="0"/>
+              <a:t>복잡한 </a:t>
+            </a:r>
+            <a:r>
+              <a:rPr lang="en-US" altLang="ko-KR" dirty="0"/>
+              <a:t>SQL</a:t>
+            </a:r>
+            <a:r>
+              <a:rPr lang="ko-KR" altLang="en-US" dirty="0"/>
+              <a:t>은 작성이 어려울 수도 </a:t>
+            </a:r>
+            <a:r>
+              <a:rPr lang="ko-KR" altLang="en-US" dirty="0" smtClean="0"/>
+              <a:t>있음</a:t>
+            </a:r>
+            <a:endParaRPr lang="ko-KR" altLang="en-US" dirty="0"/>
+          </a:p>
+        </p:txBody>
+      </p:sp>
+    </p:spTree>
+    <p:extLst>
+      <p:ext uri="{BB962C8B-B14F-4D97-AF65-F5344CB8AC3E}">
+        <p14:creationId xmlns:p14="http://schemas.microsoft.com/office/powerpoint/2010/main" val="4112330803"/>
+      </p:ext>
+    </p:extLst>
+  </p:cSld>
+  <p:clrMapOvr>
+    <a:masterClrMapping/>
+  </p:clrMapOvr>
+  <p:timing>
+    <p:tnLst>
+      <p:par>
+        <p:cTn id="1" dur="indefinite" restart="never" nodeType="tmRoot"/>
+      </p:par>
+    </p:tnLst>
+  </p:timing>
+</p:sld>
+</file>
+
+<file path=ppt/slides/slide13.xml><?xml version="1.0" encoding="utf-8"?>
+<p:sld xmlns:a="http://schemas.openxmlformats.org/drawingml/2006/main" xmlns:r="http://schemas.openxmlformats.org/officeDocument/2006/relationships" xmlns:p="http://schemas.openxmlformats.org/presentationml/2006/main">
+  <p:cSld>
+    <p:spTree>
+      <p:nvGrpSpPr>
+        <p:cNvPr id="1" name=""/>
+        <p:cNvGrpSpPr/>
+        <p:nvPr/>
+      </p:nvGrpSpPr>
+      <p:grpSpPr>
+        <a:xfrm>
+          <a:off x="0" y="0"/>
+          <a:ext cx="0" cy="0"/>
+          <a:chOff x="0" y="0"/>
+          <a:chExt cx="0" cy="0"/>
+        </a:xfrm>
+      </p:grpSpPr>
+      <p:sp>
+        <p:nvSpPr>
+          <p:cNvPr id="2" name="제목 1"/>
+          <p:cNvSpPr>
+            <a:spLocks noGrp="1"/>
+          </p:cNvSpPr>
+          <p:nvPr>
+            <p:ph type="title"/>
+          </p:nvPr>
+        </p:nvSpPr>
+        <p:spPr/>
+        <p:txBody>
+          <a:bodyPr/>
+          <a:lstStyle/>
+          <a:p>
+            <a:r>
+              <a:rPr lang="ko-KR" altLang="en-US" dirty="0"/>
+              <a:t>쿼리 방식 </a:t>
+            </a:r>
+            <a:r>
+              <a:rPr lang="ko-KR" altLang="en-US" dirty="0" smtClean="0"/>
+              <a:t>비교</a:t>
+            </a:r>
+            <a:r>
+              <a:rPr lang="en-US" altLang="ko-KR" dirty="0" smtClean="0"/>
+              <a:t>2</a:t>
+            </a:r>
+            <a:endParaRPr lang="ko-KR" altLang="en-US" dirty="0"/>
+          </a:p>
+        </p:txBody>
+      </p:sp>
+      <p:sp>
+        <p:nvSpPr>
+          <p:cNvPr id="3" name="내용 개체 틀 2"/>
+          <p:cNvSpPr>
+            <a:spLocks noGrp="1"/>
+          </p:cNvSpPr>
+          <p:nvPr>
+            <p:ph idx="1"/>
+          </p:nvPr>
+        </p:nvSpPr>
+        <p:spPr/>
+        <p:txBody>
+          <a:bodyPr/>
+          <a:lstStyle/>
+          <a:p>
+            <a:r>
+              <a:rPr lang="en-US" altLang="ko-KR" dirty="0"/>
+              <a:t>Native </a:t>
+            </a:r>
+            <a:r>
+              <a:rPr lang="en-US" altLang="ko-KR" dirty="0" smtClean="0"/>
+              <a:t>Query</a:t>
+            </a:r>
+          </a:p>
+          <a:p>
+            <a:pPr lvl="1">
+              <a:lnSpc>
+                <a:spcPct val="150000"/>
+              </a:lnSpc>
+            </a:pPr>
+            <a:r>
+              <a:rPr lang="ko-KR" altLang="en-US" dirty="0" smtClean="0"/>
+              <a:t>순수 </a:t>
+            </a:r>
+            <a:r>
+              <a:rPr lang="en-US" altLang="ko-KR" dirty="0"/>
+              <a:t>SQL</a:t>
+            </a:r>
+            <a:r>
+              <a:rPr lang="ko-KR" altLang="en-US" dirty="0"/>
+              <a:t>을 직접 </a:t>
+            </a:r>
+            <a:r>
+              <a:rPr lang="ko-KR" altLang="en-US" dirty="0" smtClean="0"/>
+              <a:t>실행</a:t>
+            </a:r>
+            <a:endParaRPr lang="en-US" altLang="ko-KR" dirty="0" smtClean="0"/>
+          </a:p>
+          <a:p>
+            <a:pPr lvl="1">
+              <a:lnSpc>
+                <a:spcPct val="150000"/>
+              </a:lnSpc>
+            </a:pPr>
+            <a:r>
+              <a:rPr lang="en-US" altLang="ko-KR" dirty="0" smtClean="0"/>
+              <a:t>@</a:t>
+            </a:r>
+            <a:r>
+              <a:rPr lang="en-US" altLang="ko-KR" dirty="0"/>
+              <a:t>Query(value = "SELECT * FROM users WHERE name = :name", </a:t>
+            </a:r>
+            <a:r>
+              <a:rPr lang="en-US" altLang="ko-KR" dirty="0" err="1"/>
+              <a:t>nativeQuery</a:t>
+            </a:r>
+            <a:r>
+              <a:rPr lang="en-US" altLang="ko-KR" dirty="0"/>
+              <a:t> = true</a:t>
+            </a:r>
+            <a:r>
+              <a:rPr lang="en-US" altLang="ko-KR" dirty="0" smtClean="0"/>
+              <a:t>)</a:t>
+            </a:r>
+          </a:p>
+          <a:p>
+            <a:pPr lvl="1">
+              <a:lnSpc>
+                <a:spcPct val="150000"/>
+              </a:lnSpc>
+            </a:pPr>
+            <a:r>
+              <a:rPr lang="ko-KR" altLang="en-US" dirty="0" smtClean="0"/>
+              <a:t>최적화된 </a:t>
+            </a:r>
+            <a:r>
+              <a:rPr lang="en-US" altLang="ko-KR" dirty="0"/>
+              <a:t>SQL </a:t>
+            </a:r>
+            <a:r>
+              <a:rPr lang="ko-KR" altLang="en-US" dirty="0"/>
+              <a:t>사용 가능</a:t>
+            </a:r>
+            <a:r>
+              <a:rPr lang="en-US" altLang="ko-KR" dirty="0"/>
+              <a:t>, </a:t>
+            </a:r>
+            <a:r>
+              <a:rPr lang="ko-KR" altLang="en-US" dirty="0"/>
+              <a:t>복잡한 쿼리 작성 </a:t>
+            </a:r>
+            <a:r>
+              <a:rPr lang="ko-KR" altLang="en-US" dirty="0" smtClean="0"/>
+              <a:t>가능</a:t>
+            </a:r>
+            <a:endParaRPr lang="en-US" altLang="ko-KR" dirty="0" smtClean="0"/>
+          </a:p>
+          <a:p>
+            <a:pPr lvl="1">
+              <a:lnSpc>
+                <a:spcPct val="150000"/>
+              </a:lnSpc>
+            </a:pPr>
+            <a:r>
+              <a:rPr lang="en-US" altLang="ko-KR" dirty="0" smtClean="0"/>
+              <a:t>DB</a:t>
+            </a:r>
+            <a:r>
+              <a:rPr lang="en-US" altLang="ko-KR" dirty="0"/>
+              <a:t> </a:t>
+            </a:r>
+            <a:r>
+              <a:rPr lang="ko-KR" altLang="en-US" dirty="0"/>
+              <a:t>종속적</a:t>
+            </a:r>
+            <a:r>
+              <a:rPr lang="en-US" altLang="ko-KR" dirty="0"/>
+              <a:t>, </a:t>
+            </a:r>
+            <a:r>
+              <a:rPr lang="ko-KR" altLang="en-US" dirty="0" smtClean="0"/>
+              <a:t>유지보수</a:t>
+            </a:r>
+            <a:endParaRPr lang="ko-KR" altLang="en-US" dirty="0"/>
+          </a:p>
+        </p:txBody>
+      </p:sp>
+    </p:spTree>
+    <p:extLst>
+      <p:ext uri="{BB962C8B-B14F-4D97-AF65-F5344CB8AC3E}">
+        <p14:creationId xmlns:p14="http://schemas.microsoft.com/office/powerpoint/2010/main" val="3771509388"/>
+      </p:ext>
+    </p:extLst>
+  </p:cSld>
+  <p:clrMapOvr>
+    <a:masterClrMapping/>
+  </p:clrMapOvr>
+  <p:timing>
+    <p:tnLst>
+      <p:par>
+        <p:cTn id="1" dur="indefinite" restart="never" nodeType="tmRoot"/>
+      </p:par>
+    </p:tnLst>
+  </p:timing>
+</p:sld>
+</file>
+
+<file path=ppt/slides/slide14.xml><?xml version="1.0" encoding="utf-8"?>
+<p:sld xmlns:a="http://schemas.openxmlformats.org/drawingml/2006/main" xmlns:r="http://schemas.openxmlformats.org/officeDocument/2006/relationships" xmlns:p="http://schemas.openxmlformats.org/presentationml/2006/main">
+  <p:cSld>
+    <p:spTree>
+      <p:nvGrpSpPr>
+        <p:cNvPr id="1" name=""/>
+        <p:cNvGrpSpPr/>
+        <p:nvPr/>
+      </p:nvGrpSpPr>
+      <p:grpSpPr>
+        <a:xfrm>
+          <a:off x="0" y="0"/>
+          <a:ext cx="0" cy="0"/>
+          <a:chOff x="0" y="0"/>
+          <a:chExt cx="0" cy="0"/>
+        </a:xfrm>
+      </p:grpSpPr>
+      <p:sp>
+        <p:nvSpPr>
+          <p:cNvPr id="2" name="제목 1"/>
+          <p:cNvSpPr>
+            <a:spLocks noGrp="1"/>
+          </p:cNvSpPr>
+          <p:nvPr>
+            <p:ph type="title"/>
+          </p:nvPr>
+        </p:nvSpPr>
+        <p:spPr/>
+        <p:txBody>
+          <a:bodyPr/>
+          <a:lstStyle/>
+          <a:p>
+            <a:r>
+              <a:rPr lang="ko-KR" altLang="en-US" dirty="0"/>
+              <a:t>쿼리 방식 </a:t>
+            </a:r>
+            <a:r>
+              <a:rPr lang="ko-KR" altLang="en-US" dirty="0" smtClean="0"/>
+              <a:t>비교</a:t>
+            </a:r>
+            <a:r>
+              <a:rPr lang="en-US" altLang="ko-KR" dirty="0" smtClean="0"/>
+              <a:t>3</a:t>
+            </a:r>
+            <a:endParaRPr lang="ko-KR" altLang="en-US" dirty="0"/>
+          </a:p>
+        </p:txBody>
+      </p:sp>
+      <p:sp>
+        <p:nvSpPr>
+          <p:cNvPr id="3" name="내용 개체 틀 2"/>
+          <p:cNvSpPr>
+            <a:spLocks noGrp="1"/>
+          </p:cNvSpPr>
+          <p:nvPr>
+            <p:ph idx="1"/>
+          </p:nvPr>
+        </p:nvSpPr>
+        <p:spPr/>
+        <p:txBody>
+          <a:bodyPr/>
+          <a:lstStyle/>
+          <a:p>
+            <a:r>
+              <a:rPr lang="ko-KR" altLang="en-US" dirty="0"/>
+              <a:t>메서드 이름 기반 쿼리 </a:t>
+            </a:r>
+            <a:r>
+              <a:rPr lang="en-US" altLang="ko-KR" dirty="0"/>
+              <a:t>(Method Query Derivation</a:t>
+            </a:r>
+            <a:r>
+              <a:rPr lang="en-US" altLang="ko-KR" dirty="0" smtClean="0"/>
+              <a:t>)</a:t>
+            </a:r>
+          </a:p>
+          <a:p>
+            <a:pPr marL="0" indent="0">
+              <a:buNone/>
+            </a:pPr>
+            <a:r>
+              <a:rPr lang="en-US" altLang="ko-KR" dirty="0" smtClean="0">
+                <a:solidFill>
+                  <a:schemeClr val="accent6"/>
+                </a:solidFill>
+              </a:rPr>
+              <a:t>(</a:t>
+            </a:r>
+            <a:r>
+              <a:rPr lang="ko-KR" altLang="en-US" dirty="0" smtClean="0">
+                <a:solidFill>
+                  <a:schemeClr val="accent6"/>
+                </a:solidFill>
+              </a:rPr>
+              <a:t>우리 수업에는 쿼리메서드로 했음</a:t>
+            </a:r>
+            <a:r>
+              <a:rPr lang="en-US" altLang="ko-KR" dirty="0" smtClean="0">
+                <a:solidFill>
+                  <a:schemeClr val="accent6"/>
+                </a:solidFill>
+              </a:rPr>
+              <a:t>)</a:t>
+            </a:r>
+          </a:p>
+          <a:p>
+            <a:pPr lvl="1">
+              <a:lnSpc>
+                <a:spcPct val="150000"/>
+              </a:lnSpc>
+            </a:pPr>
+            <a:r>
+              <a:rPr lang="ko-KR" altLang="en-US" dirty="0" err="1" smtClean="0"/>
+              <a:t>메서드명을</a:t>
+            </a:r>
+            <a:r>
+              <a:rPr lang="ko-KR" altLang="en-US" dirty="0" smtClean="0"/>
+              <a:t> </a:t>
+            </a:r>
+            <a:r>
+              <a:rPr lang="ko-KR" altLang="en-US" dirty="0"/>
+              <a:t>분석해 자동으로 </a:t>
+            </a:r>
+            <a:r>
+              <a:rPr lang="en-US" altLang="ko-KR" dirty="0"/>
+              <a:t>SQL </a:t>
+            </a:r>
+            <a:r>
+              <a:rPr lang="ko-KR" altLang="en-US" dirty="0" smtClean="0"/>
+              <a:t>생성</a:t>
+            </a:r>
+            <a:endParaRPr lang="en-US" altLang="ko-KR" dirty="0" smtClean="0"/>
+          </a:p>
+          <a:p>
+            <a:pPr lvl="1">
+              <a:lnSpc>
+                <a:spcPct val="150000"/>
+              </a:lnSpc>
+            </a:pPr>
+            <a:r>
+              <a:rPr lang="en-US" altLang="ko-KR" dirty="0" err="1" smtClean="0"/>
+              <a:t>findByName</a:t>
+            </a:r>
+            <a:r>
+              <a:rPr lang="en-US" altLang="ko-KR" dirty="0" smtClean="0"/>
+              <a:t>(String </a:t>
+            </a:r>
+            <a:r>
+              <a:rPr lang="en-US" altLang="ko-KR" dirty="0"/>
+              <a:t>name</a:t>
+            </a:r>
+            <a:r>
+              <a:rPr lang="en-US" altLang="ko-KR" dirty="0" smtClean="0"/>
+              <a:t>)</a:t>
+            </a:r>
+          </a:p>
+          <a:p>
+            <a:pPr lvl="1">
+              <a:lnSpc>
+                <a:spcPct val="150000"/>
+              </a:lnSpc>
+            </a:pPr>
+            <a:r>
+              <a:rPr lang="ko-KR" altLang="en-US" dirty="0" smtClean="0"/>
+              <a:t>간단한 </a:t>
+            </a:r>
+            <a:r>
+              <a:rPr lang="en-US" altLang="ko-KR" dirty="0"/>
+              <a:t>CRUD</a:t>
+            </a:r>
+            <a:r>
+              <a:rPr lang="ko-KR" altLang="en-US" dirty="0"/>
+              <a:t>에 적합</a:t>
+            </a:r>
+            <a:r>
+              <a:rPr lang="en-US" altLang="ko-KR" dirty="0"/>
+              <a:t>, </a:t>
+            </a:r>
+            <a:r>
+              <a:rPr lang="ko-KR" altLang="en-US" dirty="0"/>
+              <a:t>유지보수 </a:t>
+            </a:r>
+            <a:r>
+              <a:rPr lang="ko-KR" altLang="en-US" dirty="0" smtClean="0"/>
+              <a:t>쉬움</a:t>
+            </a:r>
+            <a:endParaRPr lang="en-US" altLang="ko-KR" dirty="0" smtClean="0"/>
+          </a:p>
+          <a:p>
+            <a:pPr lvl="1">
+              <a:lnSpc>
+                <a:spcPct val="150000"/>
+              </a:lnSpc>
+            </a:pPr>
+            <a:r>
+              <a:rPr lang="ko-KR" altLang="en-US" dirty="0" smtClean="0"/>
+              <a:t>복잡한 쿼리는 어려움</a:t>
+            </a:r>
+            <a:endParaRPr lang="ko-KR" altLang="en-US" dirty="0"/>
+          </a:p>
+        </p:txBody>
+      </p:sp>
+    </p:spTree>
+    <p:extLst>
+      <p:ext uri="{BB962C8B-B14F-4D97-AF65-F5344CB8AC3E}">
+        <p14:creationId xmlns:p14="http://schemas.microsoft.com/office/powerpoint/2010/main" val="1667442776"/>
+      </p:ext>
+    </p:extLst>
+  </p:cSld>
+  <p:clrMapOvr>
+    <a:masterClrMapping/>
+  </p:clrMapOvr>
+  <p:timing>
+    <p:tnLst>
+      <p:par>
+        <p:cTn id="1" dur="indefinite" restart="never" nodeType="tmRoot"/>
+      </p:par>
+    </p:tnLst>
+  </p:timing>
+</p:sld>
+</file>
+
+<file path=ppt/slides/slide15.xml><?xml version="1.0" encoding="utf-8"?>
+<p:sld xmlns:a="http://schemas.openxmlformats.org/drawingml/2006/main" xmlns:r="http://schemas.openxmlformats.org/officeDocument/2006/relationships" xmlns:p="http://schemas.openxmlformats.org/presentationml/2006/main">
+  <p:cSld>
+    <p:spTree>
+      <p:nvGrpSpPr>
+        <p:cNvPr id="1" name=""/>
+        <p:cNvGrpSpPr/>
+        <p:nvPr/>
+      </p:nvGrpSpPr>
+      <p:grpSpPr>
+        <a:xfrm>
+          <a:off x="0" y="0"/>
+          <a:ext cx="0" cy="0"/>
+          <a:chOff x="0" y="0"/>
+          <a:chExt cx="0" cy="0"/>
+        </a:xfrm>
+      </p:grpSpPr>
+      <p:sp>
+        <p:nvSpPr>
+          <p:cNvPr id="2" name="제목 1"/>
+          <p:cNvSpPr>
+            <a:spLocks noGrp="1"/>
+          </p:cNvSpPr>
+          <p:nvPr>
+            <p:ph type="title"/>
+          </p:nvPr>
+        </p:nvSpPr>
+        <p:spPr/>
+        <p:txBody>
+          <a:bodyPr/>
+          <a:lstStyle/>
+          <a:p>
+            <a:r>
+              <a:rPr lang="en-US" altLang="ko-KR" dirty="0" err="1"/>
+              <a:t>Querydsl</a:t>
+            </a:r>
+            <a:r>
+              <a:rPr lang="en-US" altLang="ko-KR" dirty="0"/>
+              <a:t> </a:t>
+            </a:r>
+            <a:r>
+              <a:rPr lang="ko-KR" altLang="en-US" dirty="0"/>
+              <a:t>이란</a:t>
+            </a:r>
+            <a:r>
+              <a:rPr lang="en-US" altLang="ko-KR" dirty="0"/>
+              <a:t>?</a:t>
+            </a:r>
+            <a:endParaRPr lang="ko-KR" altLang="en-US" dirty="0"/>
+          </a:p>
+        </p:txBody>
+      </p:sp>
+      <p:sp>
+        <p:nvSpPr>
+          <p:cNvPr id="3" name="내용 개체 틀 2"/>
+          <p:cNvSpPr>
+            <a:spLocks noGrp="1"/>
+          </p:cNvSpPr>
+          <p:nvPr>
+            <p:ph idx="1"/>
+          </p:nvPr>
+        </p:nvSpPr>
+        <p:spPr/>
+        <p:txBody>
+          <a:bodyPr/>
+          <a:lstStyle/>
+          <a:p>
+            <a:pPr>
+              <a:lnSpc>
+                <a:spcPct val="150000"/>
+              </a:lnSpc>
+            </a:pPr>
+            <a:r>
+              <a:rPr lang="en-US" altLang="ko-KR" dirty="0" err="1"/>
+              <a:t>Querydsl</a:t>
+            </a:r>
+            <a:r>
+              <a:rPr lang="ko-KR" altLang="en-US" dirty="0"/>
+              <a:t>은 </a:t>
+            </a:r>
+            <a:r>
+              <a:rPr lang="ko-KR" altLang="en-US" dirty="0" err="1"/>
+              <a:t>하이버네이트</a:t>
+            </a:r>
+            <a:r>
+              <a:rPr lang="ko-KR" altLang="en-US" dirty="0"/>
+              <a:t> 쿼리 언어</a:t>
+            </a:r>
+            <a:r>
+              <a:rPr lang="en-US" altLang="ko-KR" dirty="0"/>
+              <a:t>(HQL: Hibernate Query Language)</a:t>
+            </a:r>
+            <a:r>
+              <a:rPr lang="ko-KR" altLang="en-US" dirty="0"/>
+              <a:t>의 쿼리를 </a:t>
+            </a:r>
+            <a:r>
+              <a:rPr lang="en-US" altLang="ko-KR" dirty="0" err="1"/>
+              <a:t>typesafe</a:t>
+            </a:r>
+            <a:r>
+              <a:rPr lang="en-US" altLang="ko-KR" dirty="0"/>
+              <a:t> </a:t>
+            </a:r>
+            <a:r>
+              <a:rPr lang="ko-KR" altLang="en-US" dirty="0"/>
+              <a:t>하게 생성 및 관리해주는 프레임워크이다</a:t>
+            </a:r>
+            <a:r>
+              <a:rPr lang="en-US" altLang="ko-KR" dirty="0"/>
+              <a:t>. </a:t>
+            </a:r>
+          </a:p>
+          <a:p>
+            <a:pPr>
+              <a:lnSpc>
+                <a:spcPct val="150000"/>
+              </a:lnSpc>
+            </a:pPr>
+            <a:endParaRPr lang="en-US" altLang="ko-KR" dirty="0"/>
+          </a:p>
+          <a:p>
+            <a:pPr>
+              <a:lnSpc>
+                <a:spcPct val="150000"/>
+              </a:lnSpc>
+            </a:pPr>
+            <a:r>
+              <a:rPr lang="en-US" altLang="ko-KR" dirty="0" err="1"/>
+              <a:t>Querydsl</a:t>
+            </a:r>
+            <a:r>
+              <a:rPr lang="ko-KR" altLang="en-US" dirty="0"/>
+              <a:t>은 정적 타입을 이용하여 </a:t>
+            </a:r>
+            <a:r>
+              <a:rPr lang="en-US" altLang="ko-KR" dirty="0"/>
+              <a:t>SQL</a:t>
+            </a:r>
+            <a:r>
+              <a:rPr lang="ko-KR" altLang="en-US" dirty="0"/>
+              <a:t>과 같은 쿼리를 생성할 수 있게 해 준다</a:t>
+            </a:r>
+            <a:r>
+              <a:rPr lang="en-US" altLang="ko-KR" dirty="0"/>
+              <a:t>. </a:t>
+            </a:r>
+            <a:endParaRPr lang="ko-KR" altLang="en-US" dirty="0"/>
+          </a:p>
+        </p:txBody>
+      </p:sp>
+    </p:spTree>
+    <p:extLst>
+      <p:ext uri="{BB962C8B-B14F-4D97-AF65-F5344CB8AC3E}">
+        <p14:creationId xmlns:p14="http://schemas.microsoft.com/office/powerpoint/2010/main" val="1926438581"/>
+      </p:ext>
+    </p:extLst>
+  </p:cSld>
+  <p:clrMapOvr>
+    <a:masterClrMapping/>
+  </p:clrMapOvr>
+</p:sld>
+</file>
+
+<file path=ppt/slides/slide16.xml><?xml version="1.0" encoding="utf-8"?>
+<p:sld xmlns:a="http://schemas.openxmlformats.org/drawingml/2006/main" xmlns:r="http://schemas.openxmlformats.org/officeDocument/2006/relationships" xmlns:p="http://schemas.openxmlformats.org/presentationml/2006/main">
+  <p:cSld>
+    <p:spTree>
+      <p:nvGrpSpPr>
+        <p:cNvPr id="1" name=""/>
+        <p:cNvGrpSpPr/>
+        <p:nvPr/>
+      </p:nvGrpSpPr>
+      <p:grpSpPr>
+        <a:xfrm>
+          <a:off x="0" y="0"/>
+          <a:ext cx="0" cy="0"/>
+          <a:chOff x="0" y="0"/>
+          <a:chExt cx="0" cy="0"/>
+        </a:xfrm>
+      </p:grpSpPr>
+      <p:sp>
+        <p:nvSpPr>
+          <p:cNvPr id="2" name="제목 1"/>
+          <p:cNvSpPr>
+            <a:spLocks noGrp="1"/>
+          </p:cNvSpPr>
+          <p:nvPr>
+            <p:ph type="title"/>
+          </p:nvPr>
+        </p:nvSpPr>
+        <p:spPr/>
+        <p:txBody>
+          <a:bodyPr/>
+          <a:lstStyle/>
+          <a:p>
+            <a:r>
+              <a:rPr lang="en-US" altLang="ko-KR" dirty="0" err="1"/>
+              <a:t>Querydsl</a:t>
+            </a:r>
+            <a:r>
+              <a:rPr lang="en-US" altLang="ko-KR" dirty="0" smtClean="0"/>
+              <a:t> </a:t>
+            </a:r>
+            <a:endParaRPr lang="ko-KR" altLang="en-US" dirty="0"/>
+          </a:p>
+        </p:txBody>
+      </p:sp>
+      <p:sp>
+        <p:nvSpPr>
+          <p:cNvPr id="3" name="내용 개체 틀 2"/>
+          <p:cNvSpPr>
+            <a:spLocks noGrp="1"/>
+          </p:cNvSpPr>
+          <p:nvPr>
+            <p:ph idx="1"/>
+          </p:nvPr>
+        </p:nvSpPr>
+        <p:spPr/>
+        <p:txBody>
+          <a:bodyPr/>
+          <a:lstStyle/>
+          <a:p>
+            <a:pPr>
+              <a:lnSpc>
+                <a:spcPct val="150000"/>
+              </a:lnSpc>
+            </a:pPr>
+            <a:r>
+              <a:rPr lang="en-US" altLang="ko-KR" dirty="0" err="1"/>
+              <a:t>Querydsl</a:t>
+            </a:r>
+            <a:r>
+              <a:rPr lang="ko-KR" altLang="en-US" dirty="0"/>
+              <a:t>이 등장하기 이전에는 </a:t>
+            </a:r>
+            <a:r>
+              <a:rPr lang="en-US" altLang="ko-KR" dirty="0" err="1"/>
+              <a:t>Mybatis</a:t>
+            </a:r>
+            <a:r>
+              <a:rPr lang="en-US" altLang="ko-KR" dirty="0"/>
+              <a:t>, JPQL, Criteria </a:t>
+            </a:r>
+            <a:r>
+              <a:rPr lang="ko-KR" altLang="en-US" dirty="0"/>
+              <a:t>등 문자열 형태로 </a:t>
+            </a:r>
+            <a:r>
+              <a:rPr lang="ko-KR" altLang="en-US" dirty="0" err="1"/>
+              <a:t>쿼리문을</a:t>
+            </a:r>
+            <a:r>
+              <a:rPr lang="ko-KR" altLang="en-US" dirty="0"/>
+              <a:t> 작성하여 컴파일 시에 오류를 발견하는 것이 불가능했다</a:t>
+            </a:r>
+            <a:r>
+              <a:rPr lang="en-US" altLang="ko-KR" dirty="0" smtClean="0"/>
+              <a:t>.</a:t>
+            </a:r>
+          </a:p>
+          <a:p>
+            <a:pPr>
+              <a:lnSpc>
+                <a:spcPct val="150000"/>
+              </a:lnSpc>
+            </a:pPr>
+            <a:r>
+              <a:rPr lang="ko-KR" altLang="en-US" dirty="0"/>
+              <a:t>하지만</a:t>
+            </a:r>
+            <a:r>
+              <a:rPr lang="en-US" altLang="ko-KR" dirty="0"/>
+              <a:t>, </a:t>
+            </a:r>
+            <a:r>
+              <a:rPr lang="en-US" altLang="ko-KR" dirty="0" err="1"/>
+              <a:t>Querydsl</a:t>
+            </a:r>
+            <a:r>
+              <a:rPr lang="ko-KR" altLang="en-US" dirty="0"/>
+              <a:t>은 </a:t>
+            </a:r>
+            <a:r>
+              <a:rPr lang="ko-KR" altLang="en-US" dirty="0" err="1"/>
+              <a:t>자바코드로</a:t>
+            </a:r>
+            <a:r>
+              <a:rPr lang="ko-KR" altLang="en-US" dirty="0"/>
+              <a:t> </a:t>
+            </a:r>
+            <a:r>
+              <a:rPr lang="en-US" altLang="ko-KR" dirty="0"/>
+              <a:t>SQL</a:t>
+            </a:r>
+            <a:r>
+              <a:rPr lang="ko-KR" altLang="en-US" dirty="0"/>
+              <a:t>문을 작성할 수 있어 컴파일 시에 오류가 발생하여 잘못된 쿼리가 실행되는 것을 방지할 수 있다</a:t>
+            </a:r>
+            <a:r>
+              <a:rPr lang="en-US" altLang="ko-KR" dirty="0"/>
+              <a:t>. </a:t>
+            </a:r>
+            <a:endParaRPr lang="ko-KR" altLang="en-US" dirty="0"/>
+          </a:p>
+        </p:txBody>
+      </p:sp>
+    </p:spTree>
+    <p:extLst>
+      <p:ext uri="{BB962C8B-B14F-4D97-AF65-F5344CB8AC3E}">
+        <p14:creationId xmlns:p14="http://schemas.microsoft.com/office/powerpoint/2010/main" val="929477131"/>
+      </p:ext>
+    </p:extLst>
+  </p:cSld>
+  <p:clrMapOvr>
+    <a:masterClrMapping/>
+  </p:clrMapOvr>
+</p:sld>
+</file>
+
+<file path=ppt/slides/slide17.xml><?xml version="1.0" encoding="utf-8"?>
+<p:sld xmlns:a="http://schemas.openxmlformats.org/drawingml/2006/main" xmlns:r="http://schemas.openxmlformats.org/officeDocument/2006/relationships" xmlns:p="http://schemas.openxmlformats.org/presentationml/2006/main">
+  <p:cSld>
+    <p:spTree>
+      <p:nvGrpSpPr>
+        <p:cNvPr id="1" name=""/>
+        <p:cNvGrpSpPr/>
+        <p:nvPr/>
+      </p:nvGrpSpPr>
+      <p:grpSpPr>
+        <a:xfrm>
+          <a:off x="0" y="0"/>
+          <a:ext cx="0" cy="0"/>
+          <a:chOff x="0" y="0"/>
+          <a:chExt cx="0" cy="0"/>
+        </a:xfrm>
+      </p:grpSpPr>
+      <p:sp>
+        <p:nvSpPr>
+          <p:cNvPr id="2" name="제목 1"/>
+          <p:cNvSpPr>
+            <a:spLocks noGrp="1"/>
+          </p:cNvSpPr>
+          <p:nvPr>
+            <p:ph type="title"/>
+          </p:nvPr>
+        </p:nvSpPr>
+        <p:spPr/>
+        <p:txBody>
+          <a:bodyPr/>
+          <a:lstStyle/>
+          <a:p>
+            <a:r>
+              <a:rPr lang="en-US" altLang="ko-KR" dirty="0" err="1"/>
+              <a:t>Querydsl</a:t>
+            </a:r>
+            <a:r>
+              <a:rPr lang="ko-KR" altLang="en-US" dirty="0"/>
+              <a:t>의 장점 </a:t>
+            </a:r>
+          </a:p>
+        </p:txBody>
+      </p:sp>
+      <p:sp>
+        <p:nvSpPr>
+          <p:cNvPr id="3" name="내용 개체 틀 2"/>
+          <p:cNvSpPr>
+            <a:spLocks noGrp="1"/>
+          </p:cNvSpPr>
+          <p:nvPr>
+            <p:ph idx="1"/>
+          </p:nvPr>
+        </p:nvSpPr>
+        <p:spPr/>
+        <p:txBody>
+          <a:bodyPr/>
+          <a:lstStyle/>
+          <a:p>
+            <a:pPr>
+              <a:lnSpc>
+                <a:spcPct val="150000"/>
+              </a:lnSpc>
+            </a:pPr>
+            <a:r>
+              <a:rPr lang="en-US" altLang="ko-KR" dirty="0" err="1"/>
+              <a:t>QueryDSL</a:t>
+            </a:r>
+            <a:r>
+              <a:rPr lang="ko-KR" altLang="en-US" dirty="0"/>
+              <a:t>은 쿼리를 코드를 통해 작성하기 때문에 오타가 발생할 확률이 줄고</a:t>
+            </a:r>
+            <a:r>
+              <a:rPr lang="en-US" altLang="ko-KR" dirty="0"/>
+              <a:t>, </a:t>
+            </a:r>
+            <a:r>
+              <a:rPr lang="ko-KR" altLang="en-US" dirty="0"/>
+              <a:t>객체 지향적으로 개발할 수 있다</a:t>
+            </a:r>
+            <a:r>
+              <a:rPr lang="en-US" altLang="ko-KR" dirty="0"/>
+              <a:t>. </a:t>
+            </a:r>
+          </a:p>
+          <a:p>
+            <a:pPr>
+              <a:lnSpc>
+                <a:spcPct val="150000"/>
+              </a:lnSpc>
+            </a:pPr>
+            <a:r>
+              <a:rPr lang="ko-KR" altLang="en-US" dirty="0"/>
+              <a:t>컴파일 단계에서도 오류를 빠르게 발견할 수 있다</a:t>
+            </a:r>
+            <a:r>
+              <a:rPr lang="en-US" altLang="ko-KR" dirty="0"/>
+              <a:t>. </a:t>
+            </a:r>
+            <a:endParaRPr lang="ko-KR" altLang="en-US" dirty="0"/>
+          </a:p>
+        </p:txBody>
+      </p:sp>
+    </p:spTree>
+    <p:extLst>
+      <p:ext uri="{BB962C8B-B14F-4D97-AF65-F5344CB8AC3E}">
+        <p14:creationId xmlns:p14="http://schemas.microsoft.com/office/powerpoint/2010/main" val="700473896"/>
+      </p:ext>
+    </p:extLst>
+  </p:cSld>
+  <p:clrMapOvr>
+    <a:masterClrMapping/>
+  </p:clrMapOvr>
+</p:sld>
+</file>
+
+<file path=ppt/slides/slide18.xml><?xml version="1.0" encoding="utf-8"?>
+<p:sld xmlns:a="http://schemas.openxmlformats.org/drawingml/2006/main" xmlns:r="http://schemas.openxmlformats.org/officeDocument/2006/relationships" xmlns:p="http://schemas.openxmlformats.org/presentationml/2006/main">
+  <p:cSld>
+    <p:spTree>
+      <p:nvGrpSpPr>
+        <p:cNvPr id="1" name=""/>
+        <p:cNvGrpSpPr/>
+        <p:nvPr/>
+      </p:nvGrpSpPr>
+      <p:grpSpPr>
+        <a:xfrm>
+          <a:off x="0" y="0"/>
+          <a:ext cx="0" cy="0"/>
+          <a:chOff x="0" y="0"/>
+          <a:chExt cx="0" cy="0"/>
+        </a:xfrm>
+      </p:grpSpPr>
+      <p:sp>
+        <p:nvSpPr>
+          <p:cNvPr id="2" name="제목 1"/>
+          <p:cNvSpPr>
+            <a:spLocks noGrp="1"/>
+          </p:cNvSpPr>
+          <p:nvPr>
+            <p:ph type="title"/>
+          </p:nvPr>
+        </p:nvSpPr>
+        <p:spPr/>
+        <p:txBody>
+          <a:bodyPr/>
+          <a:lstStyle/>
+          <a:p>
+            <a:r>
+              <a:rPr lang="en-US" altLang="ko-KR" dirty="0" err="1"/>
+              <a:t>Querydsl</a:t>
+            </a:r>
+            <a:r>
+              <a:rPr lang="ko-KR" altLang="en-US" dirty="0" smtClean="0"/>
+              <a:t>의 이야기</a:t>
+            </a:r>
+            <a:r>
+              <a:rPr lang="en-US" altLang="ko-KR" dirty="0" smtClean="0"/>
+              <a:t>1</a:t>
+            </a:r>
+            <a:endParaRPr lang="ko-KR" altLang="en-US" dirty="0"/>
+          </a:p>
+        </p:txBody>
+      </p:sp>
+      <p:sp>
+        <p:nvSpPr>
+          <p:cNvPr id="3" name="내용 개체 틀 2"/>
+          <p:cNvSpPr>
+            <a:spLocks noGrp="1"/>
+          </p:cNvSpPr>
+          <p:nvPr>
+            <p:ph idx="1"/>
+          </p:nvPr>
+        </p:nvSpPr>
+        <p:spPr/>
+        <p:txBody>
+          <a:bodyPr/>
+          <a:lstStyle/>
+          <a:p>
+            <a:pPr>
+              <a:lnSpc>
+                <a:spcPct val="150000"/>
+              </a:lnSpc>
+            </a:pPr>
+            <a:r>
+              <a:rPr lang="ko-KR" altLang="en-US" dirty="0"/>
+              <a:t>결론부터 말하면</a:t>
+            </a:r>
+            <a:r>
+              <a:rPr lang="en-US" altLang="ko-KR" dirty="0"/>
+              <a:t>, </a:t>
+            </a:r>
+            <a:r>
+              <a:rPr lang="en-US" altLang="ko-KR" dirty="0" err="1"/>
+              <a:t>QueryDSL</a:t>
+            </a:r>
+            <a:r>
+              <a:rPr lang="ko-KR" altLang="en-US" dirty="0"/>
+              <a:t>은 거의 죽은 프로젝트이다</a:t>
+            </a:r>
+            <a:r>
+              <a:rPr lang="en-US" altLang="ko-KR" dirty="0"/>
+              <a:t>.</a:t>
+            </a:r>
+          </a:p>
+          <a:p>
+            <a:pPr>
+              <a:lnSpc>
+                <a:spcPct val="150000"/>
+              </a:lnSpc>
+            </a:pPr>
+            <a:endParaRPr lang="en-US" altLang="ko-KR" dirty="0"/>
+          </a:p>
+          <a:p>
+            <a:pPr>
+              <a:lnSpc>
+                <a:spcPct val="150000"/>
+              </a:lnSpc>
+            </a:pPr>
+            <a:r>
+              <a:rPr lang="ko-KR" altLang="en-US" dirty="0"/>
+              <a:t>신규 프로젝트를 개발한다면</a:t>
+            </a:r>
+            <a:r>
+              <a:rPr lang="en-US" altLang="ko-KR" dirty="0"/>
+              <a:t>, Spring</a:t>
+            </a:r>
+            <a:r>
+              <a:rPr lang="ko-KR" altLang="en-US" dirty="0"/>
+              <a:t>에서 지원도 하고 유지보수도 활발한 </a:t>
+            </a:r>
+            <a:r>
+              <a:rPr lang="en-US" altLang="ko-KR" dirty="0"/>
+              <a:t>JOOQ</a:t>
+            </a:r>
+            <a:r>
+              <a:rPr lang="ko-KR" altLang="en-US" dirty="0"/>
+              <a:t>를 사용하자</a:t>
+            </a:r>
+            <a:r>
+              <a:rPr lang="en-US" altLang="ko-KR" dirty="0"/>
+              <a:t>.</a:t>
+            </a:r>
+          </a:p>
+          <a:p>
+            <a:pPr>
+              <a:lnSpc>
+                <a:spcPct val="150000"/>
+              </a:lnSpc>
+            </a:pPr>
+            <a:r>
+              <a:rPr lang="en-US" altLang="ko-KR" dirty="0"/>
+              <a:t>JPA + JOOQ</a:t>
+            </a:r>
+            <a:r>
+              <a:rPr lang="ko-KR" altLang="en-US" dirty="0"/>
+              <a:t>를 사용한 개발도 가능하다</a:t>
+            </a:r>
+            <a:r>
+              <a:rPr lang="en-US" altLang="ko-KR" dirty="0"/>
+              <a:t>.</a:t>
+            </a:r>
+            <a:endParaRPr lang="ko-KR" altLang="en-US" dirty="0"/>
+          </a:p>
+        </p:txBody>
+      </p:sp>
+    </p:spTree>
+    <p:extLst>
+      <p:ext uri="{BB962C8B-B14F-4D97-AF65-F5344CB8AC3E}">
+        <p14:creationId xmlns:p14="http://schemas.microsoft.com/office/powerpoint/2010/main" val="4032728163"/>
+      </p:ext>
+    </p:extLst>
+  </p:cSld>
+  <p:clrMapOvr>
+    <a:masterClrMapping/>
+  </p:clrMapOvr>
+</p:sld>
+</file>
+
+<file path=ppt/slides/slide19.xml><?xml version="1.0" encoding="utf-8"?>
+<p:sld xmlns:a="http://schemas.openxmlformats.org/drawingml/2006/main" xmlns:r="http://schemas.openxmlformats.org/officeDocument/2006/relationships" xmlns:p="http://schemas.openxmlformats.org/presentationml/2006/main">
+  <p:cSld>
+    <p:spTree>
+      <p:nvGrpSpPr>
+        <p:cNvPr id="1" name=""/>
+        <p:cNvGrpSpPr/>
+        <p:nvPr/>
+      </p:nvGrpSpPr>
+      <p:grpSpPr>
+        <a:xfrm>
+          <a:off x="0" y="0"/>
+          <a:ext cx="0" cy="0"/>
+          <a:chOff x="0" y="0"/>
+          <a:chExt cx="0" cy="0"/>
+        </a:xfrm>
+      </p:grpSpPr>
+      <p:sp>
+        <p:nvSpPr>
+          <p:cNvPr id="2" name="제목 1"/>
+          <p:cNvSpPr>
+            <a:spLocks noGrp="1"/>
+          </p:cNvSpPr>
+          <p:nvPr>
+            <p:ph type="title"/>
+          </p:nvPr>
+        </p:nvSpPr>
+        <p:spPr/>
+        <p:txBody>
+          <a:bodyPr/>
+          <a:lstStyle/>
+          <a:p>
+            <a:r>
+              <a:rPr lang="en-US" altLang="ko-KR" dirty="0" err="1"/>
+              <a:t>Querydsl</a:t>
+            </a:r>
+            <a:r>
+              <a:rPr lang="ko-KR" altLang="en-US" dirty="0" smtClean="0"/>
+              <a:t>의 이야기</a:t>
+            </a:r>
+            <a:r>
+              <a:rPr lang="en-US" altLang="ko-KR" dirty="0"/>
+              <a:t>2</a:t>
+            </a:r>
+            <a:endParaRPr lang="ko-KR" altLang="en-US" dirty="0"/>
+          </a:p>
+        </p:txBody>
+      </p:sp>
+      <p:sp>
+        <p:nvSpPr>
+          <p:cNvPr id="3" name="내용 개체 틀 2"/>
+          <p:cNvSpPr>
+            <a:spLocks noGrp="1"/>
+          </p:cNvSpPr>
+          <p:nvPr>
+            <p:ph idx="1"/>
+          </p:nvPr>
+        </p:nvSpPr>
+        <p:spPr/>
+        <p:txBody>
+          <a:bodyPr>
+            <a:noAutofit/>
+          </a:bodyPr>
+          <a:lstStyle/>
+          <a:p>
+            <a:pPr>
+              <a:lnSpc>
+                <a:spcPct val="100000"/>
+              </a:lnSpc>
+            </a:pPr>
+            <a:r>
+              <a:rPr lang="ko-KR" altLang="en-US" sz="2000" dirty="0"/>
+              <a:t>두 기술은 다른 기반을 가지고 있기 때문에 둘을 비교하는 것은 맞지 않습니다</a:t>
+            </a:r>
+            <a:r>
+              <a:rPr lang="en-US" altLang="ko-KR" sz="2000" dirty="0" smtClean="0"/>
+              <a:t>.</a:t>
+            </a:r>
+            <a:endParaRPr lang="en-US" altLang="ko-KR" sz="2000" dirty="0"/>
+          </a:p>
+          <a:p>
+            <a:pPr>
+              <a:lnSpc>
+                <a:spcPct val="100000"/>
+              </a:lnSpc>
+            </a:pPr>
+            <a:r>
+              <a:rPr lang="en-US" altLang="ko-KR" sz="2000" dirty="0" err="1"/>
+              <a:t>jOOQ</a:t>
+            </a:r>
+            <a:r>
+              <a:rPr lang="ko-KR" altLang="en-US" sz="2000" dirty="0"/>
+              <a:t>의 경우에는 </a:t>
+            </a:r>
+            <a:r>
+              <a:rPr lang="en-US" altLang="ko-KR" sz="2000" dirty="0"/>
+              <a:t>SQL </a:t>
+            </a:r>
+            <a:r>
+              <a:rPr lang="ko-KR" altLang="en-US" sz="2000" dirty="0"/>
+              <a:t>자체를 편리하게 만드는 것이 목적이고</a:t>
+            </a:r>
+            <a:r>
+              <a:rPr lang="en-US" altLang="ko-KR" sz="2000" dirty="0"/>
+              <a:t>, </a:t>
+            </a:r>
+            <a:r>
+              <a:rPr lang="en-US" altLang="ko-KR" sz="2000" dirty="0" err="1"/>
+              <a:t>Querydsl</a:t>
+            </a:r>
+            <a:r>
+              <a:rPr lang="ko-KR" altLang="en-US" sz="2000" dirty="0"/>
+              <a:t>의 경우 </a:t>
+            </a:r>
+            <a:r>
+              <a:rPr lang="en-US" altLang="ko-KR" sz="2000" dirty="0"/>
+              <a:t>JPA</a:t>
+            </a:r>
+            <a:r>
+              <a:rPr lang="ko-KR" altLang="en-US" sz="2000" dirty="0"/>
+              <a:t>의 </a:t>
+            </a:r>
+            <a:r>
+              <a:rPr lang="en-US" altLang="ko-KR" sz="2000" dirty="0"/>
+              <a:t>JPQL</a:t>
+            </a:r>
+            <a:r>
+              <a:rPr lang="ko-KR" altLang="en-US" sz="2000" dirty="0"/>
+              <a:t>을 편리하게 만드는 것이 목적입니다</a:t>
+            </a:r>
+            <a:r>
+              <a:rPr lang="en-US" altLang="ko-KR" sz="2000" dirty="0"/>
+              <a:t>. (</a:t>
+            </a:r>
+            <a:r>
+              <a:rPr lang="en-US" altLang="ko-KR" sz="2000" dirty="0" err="1"/>
+              <a:t>Querydsl</a:t>
+            </a:r>
+            <a:r>
+              <a:rPr lang="ko-KR" altLang="en-US" sz="2000" dirty="0"/>
+              <a:t>이 다양한 목표를 가지고 만들어졌지만 실질적으로 </a:t>
+            </a:r>
+            <a:r>
+              <a:rPr lang="en-US" altLang="ko-KR" sz="2000" dirty="0"/>
+              <a:t>JPQL</a:t>
+            </a:r>
+            <a:r>
+              <a:rPr lang="ko-KR" altLang="en-US" sz="2000" dirty="0"/>
+              <a:t>에 주로 사용됩니다</a:t>
+            </a:r>
+            <a:r>
+              <a:rPr lang="en-US" altLang="ko-KR" sz="2000" dirty="0" smtClean="0"/>
+              <a:t>.)</a:t>
+            </a:r>
+            <a:endParaRPr lang="en-US" altLang="ko-KR" sz="2000" dirty="0"/>
+          </a:p>
+          <a:p>
+            <a:pPr>
+              <a:lnSpc>
+                <a:spcPct val="100000"/>
+              </a:lnSpc>
+            </a:pPr>
+            <a:r>
+              <a:rPr lang="en-US" altLang="ko-KR" sz="2000" dirty="0" err="1"/>
+              <a:t>jOOQ</a:t>
+            </a:r>
+            <a:r>
+              <a:rPr lang="ko-KR" altLang="en-US" sz="2000" dirty="0"/>
+              <a:t>는 데이터베이스 테이블을 기반으로 </a:t>
+            </a:r>
+            <a:r>
+              <a:rPr lang="ko-KR" altLang="en-US" sz="2000" dirty="0" err="1"/>
+              <a:t>쿼리용</a:t>
+            </a:r>
+            <a:r>
+              <a:rPr lang="ko-KR" altLang="en-US" sz="2000" dirty="0"/>
+              <a:t> 파일을 만들어냅니다</a:t>
+            </a:r>
+            <a:r>
+              <a:rPr lang="en-US" altLang="ko-KR" sz="2000" dirty="0"/>
+              <a:t>. </a:t>
+            </a:r>
+            <a:r>
+              <a:rPr lang="ko-KR" altLang="en-US" sz="2000" dirty="0"/>
+              <a:t>반면에 </a:t>
+            </a:r>
+            <a:r>
+              <a:rPr lang="en-US" altLang="ko-KR" sz="2000" dirty="0" err="1"/>
+              <a:t>Querydsl</a:t>
+            </a:r>
+            <a:r>
+              <a:rPr lang="ko-KR" altLang="en-US" sz="2000" dirty="0"/>
+              <a:t>은 </a:t>
+            </a:r>
+            <a:r>
+              <a:rPr lang="en-US" altLang="ko-KR" sz="2000" dirty="0"/>
+              <a:t>JPA </a:t>
+            </a:r>
+            <a:r>
+              <a:rPr lang="ko-KR" altLang="en-US" sz="2000" dirty="0"/>
+              <a:t>자바 </a:t>
+            </a:r>
+            <a:r>
+              <a:rPr lang="ko-KR" altLang="en-US" sz="2000" dirty="0" err="1"/>
+              <a:t>엔티티</a:t>
+            </a:r>
+            <a:r>
+              <a:rPr lang="ko-KR" altLang="en-US" sz="2000" dirty="0"/>
+              <a:t> 객체를 기반으로 </a:t>
+            </a:r>
+            <a:r>
+              <a:rPr lang="ko-KR" altLang="en-US" sz="2000" dirty="0" err="1"/>
+              <a:t>쿼리용</a:t>
+            </a:r>
+            <a:r>
+              <a:rPr lang="ko-KR" altLang="en-US" sz="2000" dirty="0"/>
+              <a:t> 파일을 만들어냅니다</a:t>
+            </a:r>
+            <a:r>
+              <a:rPr lang="en-US" altLang="ko-KR" sz="2000" dirty="0" smtClean="0"/>
+              <a:t>.</a:t>
+            </a:r>
+            <a:endParaRPr lang="en-US" altLang="ko-KR" sz="2000" dirty="0"/>
+          </a:p>
+          <a:p>
+            <a:pPr>
+              <a:lnSpc>
+                <a:spcPct val="100000"/>
+              </a:lnSpc>
+            </a:pPr>
+            <a:r>
+              <a:rPr lang="ko-KR" altLang="en-US" sz="2000" dirty="0"/>
+              <a:t>따라서 만약 </a:t>
+            </a:r>
+            <a:r>
+              <a:rPr lang="en-US" altLang="ko-KR" sz="2000" dirty="0"/>
+              <a:t>JPA</a:t>
+            </a:r>
+            <a:r>
+              <a:rPr lang="ko-KR" altLang="en-US" sz="2000" dirty="0"/>
+              <a:t>를 사용하지 않는다면 </a:t>
+            </a:r>
+            <a:r>
+              <a:rPr lang="en-US" altLang="ko-KR" sz="2000" dirty="0" err="1"/>
+              <a:t>MyBatis</a:t>
+            </a:r>
+            <a:r>
+              <a:rPr lang="en-US" altLang="ko-KR" sz="2000" dirty="0"/>
+              <a:t> </a:t>
+            </a:r>
+            <a:r>
+              <a:rPr lang="ko-KR" altLang="en-US" sz="2000" dirty="0"/>
+              <a:t>또는 </a:t>
+            </a:r>
+            <a:r>
+              <a:rPr lang="en-US" altLang="ko-KR" sz="2000" dirty="0" err="1"/>
+              <a:t>jOOQ</a:t>
+            </a:r>
+            <a:r>
+              <a:rPr lang="ko-KR" altLang="en-US" sz="2000" dirty="0"/>
+              <a:t>를 사용하시면 되고</a:t>
+            </a:r>
+            <a:r>
+              <a:rPr lang="en-US" altLang="ko-KR" sz="2000" dirty="0"/>
+              <a:t>, JPA</a:t>
+            </a:r>
+            <a:r>
+              <a:rPr lang="ko-KR" altLang="en-US" sz="2000" dirty="0"/>
+              <a:t>의 </a:t>
+            </a:r>
+            <a:r>
+              <a:rPr lang="en-US" altLang="ko-KR" sz="2000" dirty="0"/>
+              <a:t>JPQL</a:t>
+            </a:r>
+            <a:r>
+              <a:rPr lang="ko-KR" altLang="en-US" sz="2000" dirty="0"/>
+              <a:t>을 편리하게 다루고 싶다면 </a:t>
+            </a:r>
+            <a:r>
+              <a:rPr lang="en-US" altLang="ko-KR" sz="2000" dirty="0" err="1"/>
+              <a:t>Querydsl</a:t>
+            </a:r>
+            <a:r>
+              <a:rPr lang="ko-KR" altLang="en-US" sz="2000" dirty="0"/>
+              <a:t>을 사용하시면 됩니다</a:t>
+            </a:r>
+            <a:r>
+              <a:rPr lang="en-US" altLang="ko-KR" sz="2000" dirty="0" smtClean="0"/>
+              <a:t>.</a:t>
+            </a:r>
+            <a:endParaRPr lang="en-US" altLang="ko-KR" sz="2000" dirty="0"/>
+          </a:p>
+          <a:p>
+            <a:pPr>
+              <a:lnSpc>
+                <a:spcPct val="100000"/>
+              </a:lnSpc>
+            </a:pPr>
+            <a:r>
+              <a:rPr lang="ko-KR" altLang="en-US" sz="2000" dirty="0" smtClean="0"/>
+              <a:t>이것은 </a:t>
+            </a:r>
+            <a:r>
+              <a:rPr lang="ko-KR" altLang="en-US" sz="2000" dirty="0"/>
+              <a:t>저의 생각이지만 국내에서는 </a:t>
+            </a:r>
+            <a:r>
+              <a:rPr lang="en-US" altLang="ko-KR" sz="2000" dirty="0"/>
+              <a:t>SQL</a:t>
+            </a:r>
+            <a:r>
+              <a:rPr lang="ko-KR" altLang="en-US" sz="2000" dirty="0"/>
+              <a:t>을 다루는 기술에서 </a:t>
+            </a:r>
+            <a:r>
+              <a:rPr lang="en-US" altLang="ko-KR" sz="2000" dirty="0" err="1"/>
+              <a:t>MyBatis</a:t>
+            </a:r>
+            <a:r>
+              <a:rPr lang="ko-KR" altLang="en-US" sz="2000" dirty="0"/>
+              <a:t>가 큰 우위를 점하고 있어서</a:t>
+            </a:r>
+            <a:r>
+              <a:rPr lang="en-US" altLang="ko-KR" sz="2000" dirty="0"/>
+              <a:t>, </a:t>
+            </a:r>
+            <a:r>
+              <a:rPr lang="en-US" altLang="ko-KR" sz="2000" dirty="0" err="1"/>
+              <a:t>jOOQ</a:t>
+            </a:r>
+            <a:r>
+              <a:rPr lang="ko-KR" altLang="en-US" sz="2000" dirty="0"/>
+              <a:t>를 사용하는 곳을 찾기 어렵다 생각합니다</a:t>
+            </a:r>
+            <a:r>
+              <a:rPr lang="en-US" altLang="ko-KR" sz="2400" dirty="0" smtClean="0"/>
+              <a:t>. (</a:t>
+            </a:r>
+            <a:r>
+              <a:rPr lang="ko-KR" altLang="en-US" sz="2400" dirty="0" err="1" smtClean="0"/>
+              <a:t>김영한님</a:t>
+            </a:r>
+            <a:r>
+              <a:rPr lang="ko-KR" altLang="en-US" sz="2400" dirty="0" smtClean="0"/>
+              <a:t> 글 발취</a:t>
+            </a:r>
+            <a:r>
+              <a:rPr lang="en-US" altLang="ko-KR" sz="2400" dirty="0" smtClean="0"/>
+              <a:t>)</a:t>
+            </a:r>
+            <a:endParaRPr lang="ko-KR" altLang="en-US" sz="2400" dirty="0"/>
+          </a:p>
+        </p:txBody>
+      </p:sp>
+    </p:spTree>
+    <p:extLst>
+      <p:ext uri="{BB962C8B-B14F-4D97-AF65-F5344CB8AC3E}">
+        <p14:creationId xmlns:p14="http://schemas.microsoft.com/office/powerpoint/2010/main" val="1861859697"/>
+      </p:ext>
+    </p:extLst>
+  </p:cSld>
+  <p:clrMapOvr>
+    <a:masterClrMapping/>
+  </p:clrMapOvr>
+  <p:timing>
+    <p:tnLst>
+      <p:par>
+        <p:cTn id="1" dur="indefinite" restart="never" nodeType="tmRoot"/>
+      </p:par>
+    </p:tnLst>
+  </p:timing>
+</p:sld>
+</file>
+
 <file path=ppt/slides/slide2.xml><?xml version="1.0" encoding="utf-8"?>
 <p:sld xmlns:a="http://schemas.openxmlformats.org/drawingml/2006/main" xmlns:r="http://schemas.openxmlformats.org/officeDocument/2006/relationships" xmlns:p="http://schemas.openxmlformats.org/presentationml/2006/main">
   <p:cSld>
@@ -3116,16 +4937,848 @@
           <a:lstStyle/>
           <a:p>
             <a:r>
+              <a:rPr lang="en-US" altLang="ko-KR" dirty="0"/>
+              <a:t>JPA(Java Persistence API)</a:t>
+            </a:r>
+            <a:endParaRPr lang="ko-KR" altLang="en-US" dirty="0"/>
+          </a:p>
+        </p:txBody>
+      </p:sp>
+      <p:pic>
+        <p:nvPicPr>
+          <p:cNvPr id="4" name="내용 개체 틀 3"/>
+          <p:cNvPicPr>
+            <a:picLocks noGrp="1" noChangeAspect="1"/>
+          </p:cNvPicPr>
+          <p:nvPr>
+            <p:ph idx="1"/>
+          </p:nvPr>
+        </p:nvPicPr>
+        <p:blipFill>
+          <a:blip r:embed="rId2"/>
+          <a:stretch>
+            <a:fillRect/>
+          </a:stretch>
+        </p:blipFill>
+        <p:spPr>
+          <a:xfrm>
+            <a:off x="3865905" y="2243959"/>
+            <a:ext cx="4460190" cy="3242441"/>
+          </a:xfrm>
+          <a:prstGeom prst="rect">
+            <a:avLst/>
+          </a:prstGeom>
+        </p:spPr>
+      </p:pic>
+      <p:sp>
+        <p:nvSpPr>
+          <p:cNvPr id="5" name="직사각형 4"/>
+          <p:cNvSpPr/>
+          <p:nvPr/>
+        </p:nvSpPr>
+        <p:spPr>
+          <a:xfrm>
+            <a:off x="1294700" y="1690688"/>
+            <a:ext cx="6096000" cy="646331"/>
+          </a:xfrm>
+          <a:prstGeom prst="rect">
+            <a:avLst/>
+          </a:prstGeom>
+        </p:spPr>
+        <p:txBody>
+          <a:bodyPr>
+            <a:spAutoFit/>
+          </a:bodyPr>
+          <a:lstStyle/>
+          <a:p>
+            <a:r>
+              <a:rPr lang="en-US" altLang="ko-KR" dirty="0"/>
+              <a:t>JPA</a:t>
+            </a:r>
+            <a:r>
+              <a:rPr lang="ko-KR" altLang="en-US" dirty="0"/>
+              <a:t>는 자바 진영에서 </a:t>
+            </a:r>
+            <a:r>
+              <a:rPr lang="en-US" altLang="ko-KR" dirty="0"/>
+              <a:t>ORM(Object-Relational Mapping) </a:t>
+            </a:r>
+            <a:r>
+              <a:rPr lang="ko-KR" altLang="en-US" dirty="0"/>
+              <a:t>기술 표준으로 사용되는 인터페이스의 모음</a:t>
+            </a:r>
+          </a:p>
+        </p:txBody>
+      </p:sp>
+      <p:sp>
+        <p:nvSpPr>
+          <p:cNvPr id="6" name="직사각형 5"/>
+          <p:cNvSpPr/>
+          <p:nvPr/>
+        </p:nvSpPr>
+        <p:spPr>
+          <a:xfrm>
+            <a:off x="4876800" y="5261805"/>
+            <a:ext cx="6096000" cy="646331"/>
+          </a:xfrm>
+          <a:prstGeom prst="rect">
+            <a:avLst/>
+          </a:prstGeom>
+        </p:spPr>
+        <p:txBody>
+          <a:bodyPr>
+            <a:spAutoFit/>
+          </a:bodyPr>
+          <a:lstStyle/>
+          <a:p>
+            <a:r>
+              <a:rPr lang="ko-KR" altLang="en-US" dirty="0"/>
+              <a:t>실제적으로 </a:t>
+            </a:r>
+            <a:r>
+              <a:rPr lang="ko-KR" altLang="en-US" dirty="0" smtClean="0"/>
+              <a:t>구현된 것이 </a:t>
+            </a:r>
+            <a:r>
+              <a:rPr lang="ko-KR" altLang="en-US" dirty="0"/>
+              <a:t>아니라 구현된 클래스와 매핑을 해주기 위해 사용되는 프레임워크</a:t>
+            </a:r>
+          </a:p>
+        </p:txBody>
+      </p:sp>
+    </p:spTree>
+    <p:extLst>
+      <p:ext uri="{BB962C8B-B14F-4D97-AF65-F5344CB8AC3E}">
+        <p14:creationId xmlns:p14="http://schemas.microsoft.com/office/powerpoint/2010/main" val="443460012"/>
+      </p:ext>
+    </p:extLst>
+  </p:cSld>
+  <p:clrMapOvr>
+    <a:masterClrMapping/>
+  </p:clrMapOvr>
+</p:sld>
+</file>
+
+<file path=ppt/slides/slide20.xml><?xml version="1.0" encoding="utf-8"?>
+<p:sld xmlns:a="http://schemas.openxmlformats.org/drawingml/2006/main" xmlns:r="http://schemas.openxmlformats.org/officeDocument/2006/relationships" xmlns:p="http://schemas.openxmlformats.org/presentationml/2006/main">
+  <p:cSld>
+    <p:spTree>
+      <p:nvGrpSpPr>
+        <p:cNvPr id="1" name=""/>
+        <p:cNvGrpSpPr/>
+        <p:nvPr/>
+      </p:nvGrpSpPr>
+      <p:grpSpPr>
+        <a:xfrm>
+          <a:off x="0" y="0"/>
+          <a:ext cx="0" cy="0"/>
+          <a:chOff x="0" y="0"/>
+          <a:chExt cx="0" cy="0"/>
+        </a:xfrm>
+      </p:grpSpPr>
+      <p:sp>
+        <p:nvSpPr>
+          <p:cNvPr id="2" name="제목 1"/>
+          <p:cNvSpPr>
+            <a:spLocks noGrp="1"/>
+          </p:cNvSpPr>
+          <p:nvPr>
+            <p:ph type="title"/>
+          </p:nvPr>
+        </p:nvSpPr>
+        <p:spPr/>
+        <p:txBody>
+          <a:bodyPr/>
+          <a:lstStyle/>
+          <a:p>
+            <a:r>
+              <a:rPr lang="ko-KR" altLang="en-US" dirty="0" smtClean="0"/>
+              <a:t>특강</a:t>
+            </a:r>
+            <a:r>
+              <a:rPr lang="en-US" altLang="ko-KR" dirty="0" smtClean="0"/>
+              <a:t>: </a:t>
+            </a:r>
+            <a:r>
+              <a:rPr lang="ko-KR" altLang="en-US" dirty="0" err="1" smtClean="0"/>
+              <a:t>레디스</a:t>
+            </a:r>
+            <a:endParaRPr lang="ko-KR" altLang="en-US" dirty="0"/>
+          </a:p>
+        </p:txBody>
+      </p:sp>
+      <p:pic>
+        <p:nvPicPr>
+          <p:cNvPr id="4" name="내용 개체 틀 3"/>
+          <p:cNvPicPr>
+            <a:picLocks noGrp="1" noChangeAspect="1"/>
+          </p:cNvPicPr>
+          <p:nvPr>
+            <p:ph idx="1"/>
+          </p:nvPr>
+        </p:nvPicPr>
+        <p:blipFill>
+          <a:blip r:embed="rId2"/>
+          <a:stretch>
+            <a:fillRect/>
+          </a:stretch>
+        </p:blipFill>
+        <p:spPr>
+          <a:xfrm>
+            <a:off x="1960423" y="1950665"/>
+            <a:ext cx="8271154" cy="3496634"/>
+          </a:xfrm>
+          <a:prstGeom prst="rect">
+            <a:avLst/>
+          </a:prstGeom>
+        </p:spPr>
+      </p:pic>
+    </p:spTree>
+    <p:extLst>
+      <p:ext uri="{BB962C8B-B14F-4D97-AF65-F5344CB8AC3E}">
+        <p14:creationId xmlns:p14="http://schemas.microsoft.com/office/powerpoint/2010/main" val="22351965"/>
+      </p:ext>
+    </p:extLst>
+  </p:cSld>
+  <p:clrMapOvr>
+    <a:masterClrMapping/>
+  </p:clrMapOvr>
+  <p:timing>
+    <p:tnLst>
+      <p:par>
+        <p:cTn id="1" dur="indefinite" restart="never" nodeType="tmRoot"/>
+      </p:par>
+    </p:tnLst>
+  </p:timing>
+</p:sld>
+</file>
+
+<file path=ppt/slides/slide21.xml><?xml version="1.0" encoding="utf-8"?>
+<p:sld xmlns:a="http://schemas.openxmlformats.org/drawingml/2006/main" xmlns:r="http://schemas.openxmlformats.org/officeDocument/2006/relationships" xmlns:p="http://schemas.openxmlformats.org/presentationml/2006/main">
+  <p:cSld>
+    <p:spTree>
+      <p:nvGrpSpPr>
+        <p:cNvPr id="1" name=""/>
+        <p:cNvGrpSpPr/>
+        <p:nvPr/>
+      </p:nvGrpSpPr>
+      <p:grpSpPr>
+        <a:xfrm>
+          <a:off x="0" y="0"/>
+          <a:ext cx="0" cy="0"/>
+          <a:chOff x="0" y="0"/>
+          <a:chExt cx="0" cy="0"/>
+        </a:xfrm>
+      </p:grpSpPr>
+      <p:sp>
+        <p:nvSpPr>
+          <p:cNvPr id="2" name="제목 1"/>
+          <p:cNvSpPr>
+            <a:spLocks noGrp="1"/>
+          </p:cNvSpPr>
+          <p:nvPr>
+            <p:ph type="title"/>
+          </p:nvPr>
+        </p:nvSpPr>
+        <p:spPr/>
+        <p:txBody>
+          <a:bodyPr>
+            <a:normAutofit/>
+          </a:bodyPr>
+          <a:lstStyle/>
+          <a:p>
+            <a:r>
+              <a:rPr lang="ko-KR" altLang="en-US" sz="4000" dirty="0" err="1" smtClean="0"/>
+              <a:t>레디스</a:t>
+            </a:r>
+            <a:r>
+              <a:rPr lang="en-US" altLang="ko-KR" sz="4000" dirty="0" smtClean="0"/>
+              <a:t> (</a:t>
+            </a:r>
+            <a:r>
+              <a:rPr lang="en-US" altLang="ko-KR" sz="4000" dirty="0" err="1" smtClean="0"/>
+              <a:t>Redis</a:t>
+            </a:r>
+            <a:r>
+              <a:rPr lang="ko-KR" altLang="en-US" sz="4000" dirty="0"/>
+              <a:t> </a:t>
+            </a:r>
+            <a:r>
+              <a:rPr lang="en-US" altLang="ko-KR" sz="4000" dirty="0" smtClean="0"/>
+              <a:t>: Remote Dictionary Server)</a:t>
+            </a:r>
+            <a:endParaRPr lang="ko-KR" altLang="en-US" sz="4000" dirty="0"/>
+          </a:p>
+        </p:txBody>
+      </p:sp>
+      <p:sp>
+        <p:nvSpPr>
+          <p:cNvPr id="3" name="내용 개체 틀 2"/>
+          <p:cNvSpPr>
+            <a:spLocks noGrp="1"/>
+          </p:cNvSpPr>
+          <p:nvPr>
+            <p:ph idx="1"/>
+          </p:nvPr>
+        </p:nvSpPr>
+        <p:spPr/>
+        <p:txBody>
+          <a:bodyPr>
+            <a:normAutofit fontScale="77500" lnSpcReduction="20000"/>
+          </a:bodyPr>
+          <a:lstStyle/>
+          <a:p>
+            <a:pPr>
+              <a:lnSpc>
+                <a:spcPct val="150000"/>
+              </a:lnSpc>
+            </a:pPr>
+            <a:r>
+              <a:rPr lang="en-US" altLang="ko-KR" dirty="0"/>
+              <a:t>in-memory </a:t>
+            </a:r>
+            <a:r>
+              <a:rPr lang="ko-KR" altLang="en-US" dirty="0"/>
+              <a:t>형태의 </a:t>
+            </a:r>
+            <a:r>
+              <a:rPr lang="en-US" altLang="ko-KR" dirty="0"/>
+              <a:t>No-SQL</a:t>
+            </a:r>
+            <a:r>
+              <a:rPr lang="ko-KR" altLang="en-US" dirty="0"/>
+              <a:t>로써 </a:t>
+            </a:r>
+            <a:r>
+              <a:rPr lang="en-US" altLang="ko-KR" dirty="0"/>
+              <a:t>Key-Value </a:t>
+            </a:r>
+            <a:r>
+              <a:rPr lang="ko-KR" altLang="en-US" dirty="0"/>
+              <a:t>쌍의 </a:t>
+            </a:r>
+            <a:r>
+              <a:rPr lang="ko-KR" altLang="en-US" dirty="0" err="1"/>
+              <a:t>해쉬</a:t>
+            </a:r>
+            <a:r>
+              <a:rPr lang="ko-KR" altLang="en-US" dirty="0"/>
+              <a:t> 맵 형태의 </a:t>
+            </a:r>
+            <a:r>
+              <a:rPr lang="ko-KR" altLang="en-US" dirty="0" smtClean="0"/>
+              <a:t>데이터베이스입니다</a:t>
+            </a:r>
+            <a:r>
+              <a:rPr lang="en-US" altLang="ko-KR" dirty="0" smtClean="0"/>
+              <a:t>.</a:t>
+            </a:r>
+          </a:p>
+          <a:p>
+            <a:pPr>
+              <a:lnSpc>
+                <a:spcPct val="150000"/>
+              </a:lnSpc>
+            </a:pPr>
+            <a:r>
+              <a:rPr lang="en-US" altLang="ko-KR" dirty="0"/>
+              <a:t>in-memory: disk</a:t>
+            </a:r>
+            <a:r>
+              <a:rPr lang="ko-KR" altLang="en-US" dirty="0"/>
+              <a:t>가 아닌 </a:t>
+            </a:r>
+            <a:r>
+              <a:rPr lang="en-US" altLang="ko-KR" dirty="0"/>
+              <a:t>memory</a:t>
+            </a:r>
+            <a:r>
+              <a:rPr lang="ko-KR" altLang="en-US" dirty="0"/>
+              <a:t>에 저장하기 때문에 </a:t>
+            </a:r>
+            <a:r>
+              <a:rPr lang="en-US" altLang="ko-KR" dirty="0"/>
+              <a:t>disk I/O </a:t>
+            </a:r>
+            <a:r>
+              <a:rPr lang="ko-KR" altLang="en-US" dirty="0"/>
+              <a:t>작업이 발생하지 않아 속도가 빠르며</a:t>
+            </a:r>
+            <a:r>
+              <a:rPr lang="en-US" altLang="ko-KR" dirty="0"/>
+              <a:t>, </a:t>
+            </a:r>
+            <a:r>
+              <a:rPr lang="ko-KR" altLang="en-US" dirty="0"/>
+              <a:t>휘발성입니다</a:t>
+            </a:r>
+            <a:r>
+              <a:rPr lang="en-US" altLang="ko-KR" dirty="0" smtClean="0"/>
+              <a:t>.</a:t>
+            </a:r>
+            <a:endParaRPr lang="en-US" altLang="ko-KR" dirty="0"/>
+          </a:p>
+          <a:p>
+            <a:pPr>
+              <a:lnSpc>
+                <a:spcPct val="150000"/>
+              </a:lnSpc>
+            </a:pPr>
+            <a:r>
+              <a:rPr lang="en-US" altLang="ko-KR" dirty="0"/>
+              <a:t>No-SQL: Not Only SQL</a:t>
+            </a:r>
+            <a:r>
+              <a:rPr lang="ko-KR" altLang="en-US" dirty="0"/>
+              <a:t>를 뜻하며 </a:t>
+            </a:r>
+            <a:r>
+              <a:rPr lang="en-US" altLang="ko-KR" dirty="0"/>
+              <a:t>RDBMS</a:t>
+            </a:r>
+            <a:r>
+              <a:rPr lang="ko-KR" altLang="en-US" dirty="0"/>
+              <a:t>에 비해 속도가 빠른 장점이 있습니다</a:t>
+            </a:r>
+            <a:r>
+              <a:rPr lang="en-US" altLang="ko-KR" dirty="0" smtClean="0"/>
+              <a:t>.</a:t>
+            </a:r>
+          </a:p>
+          <a:p>
+            <a:pPr>
+              <a:lnSpc>
+                <a:spcPct val="150000"/>
+              </a:lnSpc>
+            </a:pPr>
+            <a:r>
+              <a:rPr lang="ko-KR" altLang="en-US" dirty="0" smtClean="0">
+                <a:solidFill>
+                  <a:srgbClr val="00B050"/>
+                </a:solidFill>
+              </a:rPr>
+              <a:t>우리 </a:t>
+            </a:r>
+            <a:r>
+              <a:rPr lang="ko-KR" altLang="en-US" dirty="0">
+                <a:solidFill>
+                  <a:srgbClr val="00B050"/>
+                </a:solidFill>
+              </a:rPr>
+              <a:t>프로젝트에서는 확장성을 고려하여 다양한 </a:t>
+            </a:r>
+            <a:r>
+              <a:rPr lang="ko-KR" altLang="en-US" dirty="0" err="1">
+                <a:solidFill>
+                  <a:srgbClr val="00B050"/>
+                </a:solidFill>
+              </a:rPr>
+              <a:t>자료형과</a:t>
+            </a:r>
+            <a:r>
+              <a:rPr lang="ko-KR" altLang="en-US" dirty="0">
+                <a:solidFill>
+                  <a:srgbClr val="00B050"/>
+                </a:solidFill>
+              </a:rPr>
+              <a:t> 백업 및 복구 기능 등 다양한 </a:t>
+            </a:r>
+            <a:r>
+              <a:rPr lang="ko-KR" altLang="en-US" dirty="0" smtClean="0">
+                <a:solidFill>
+                  <a:srgbClr val="00B050"/>
+                </a:solidFill>
+              </a:rPr>
+              <a:t>측면에서 </a:t>
+            </a:r>
+            <a:r>
+              <a:rPr lang="en-US" altLang="ko-KR" dirty="0" err="1" smtClean="0">
+                <a:solidFill>
+                  <a:srgbClr val="00B050"/>
+                </a:solidFill>
+              </a:rPr>
+              <a:t>Redis</a:t>
+            </a:r>
+            <a:r>
+              <a:rPr lang="ko-KR" altLang="en-US" dirty="0">
+                <a:solidFill>
+                  <a:srgbClr val="00B050"/>
+                </a:solidFill>
+              </a:rPr>
+              <a:t>가 좋다고 판단되어 </a:t>
+            </a:r>
+            <a:r>
+              <a:rPr lang="en-US" altLang="ko-KR" dirty="0" err="1">
+                <a:solidFill>
+                  <a:srgbClr val="00B050"/>
+                </a:solidFill>
+              </a:rPr>
+              <a:t>Redis</a:t>
+            </a:r>
+            <a:r>
+              <a:rPr lang="ko-KR" altLang="en-US" dirty="0">
+                <a:solidFill>
+                  <a:srgbClr val="00B050"/>
+                </a:solidFill>
+              </a:rPr>
+              <a:t>를 선택하게 되었습니다</a:t>
+            </a:r>
+            <a:r>
+              <a:rPr lang="en-US" altLang="ko-KR" dirty="0">
+                <a:solidFill>
+                  <a:srgbClr val="00B050"/>
+                </a:solidFill>
+              </a:rPr>
+              <a:t>.</a:t>
+            </a:r>
+            <a:endParaRPr lang="ko-KR" altLang="en-US" dirty="0">
+              <a:solidFill>
+                <a:srgbClr val="00B050"/>
+              </a:solidFill>
+            </a:endParaRPr>
+          </a:p>
+        </p:txBody>
+      </p:sp>
+    </p:spTree>
+    <p:extLst>
+      <p:ext uri="{BB962C8B-B14F-4D97-AF65-F5344CB8AC3E}">
+        <p14:creationId xmlns:p14="http://schemas.microsoft.com/office/powerpoint/2010/main" val="4057705929"/>
+      </p:ext>
+    </p:extLst>
+  </p:cSld>
+  <p:clrMapOvr>
+    <a:masterClrMapping/>
+  </p:clrMapOvr>
+  <p:timing>
+    <p:tnLst>
+      <p:par>
+        <p:cTn id="1" dur="indefinite" restart="never" nodeType="tmRoot"/>
+      </p:par>
+    </p:tnLst>
+  </p:timing>
+</p:sld>
+</file>
+
+<file path=ppt/slides/slide22.xml><?xml version="1.0" encoding="utf-8"?>
+<p:sld xmlns:a="http://schemas.openxmlformats.org/drawingml/2006/main" xmlns:r="http://schemas.openxmlformats.org/officeDocument/2006/relationships" xmlns:p="http://schemas.openxmlformats.org/presentationml/2006/main">
+  <p:cSld>
+    <p:spTree>
+      <p:nvGrpSpPr>
+        <p:cNvPr id="1" name=""/>
+        <p:cNvGrpSpPr/>
+        <p:nvPr/>
+      </p:nvGrpSpPr>
+      <p:grpSpPr>
+        <a:xfrm>
+          <a:off x="0" y="0"/>
+          <a:ext cx="0" cy="0"/>
+          <a:chOff x="0" y="0"/>
+          <a:chExt cx="0" cy="0"/>
+        </a:xfrm>
+      </p:grpSpPr>
+      <p:sp>
+        <p:nvSpPr>
+          <p:cNvPr id="2" name="제목 1"/>
+          <p:cNvSpPr>
+            <a:spLocks noGrp="1"/>
+          </p:cNvSpPr>
+          <p:nvPr>
+            <p:ph type="title"/>
+          </p:nvPr>
+        </p:nvSpPr>
+        <p:spPr/>
+        <p:txBody>
+          <a:bodyPr/>
+          <a:lstStyle/>
+          <a:p>
+            <a:r>
+              <a:rPr lang="ko-KR" altLang="en-US" dirty="0" smtClean="0"/>
+              <a:t>특강</a:t>
+            </a:r>
+            <a:r>
+              <a:rPr lang="en-US" altLang="ko-KR" dirty="0" smtClean="0"/>
+              <a:t>: H2 </a:t>
+            </a:r>
+            <a:r>
+              <a:rPr lang="en-US" altLang="ko-KR" dirty="0"/>
+              <a:t>In-Memory Mode</a:t>
+            </a:r>
+            <a:endParaRPr lang="ko-KR" altLang="en-US" dirty="0"/>
+          </a:p>
+        </p:txBody>
+      </p:sp>
+      <p:sp>
+        <p:nvSpPr>
+          <p:cNvPr id="3" name="내용 개체 틀 2"/>
+          <p:cNvSpPr>
+            <a:spLocks noGrp="1"/>
+          </p:cNvSpPr>
+          <p:nvPr>
+            <p:ph idx="1"/>
+          </p:nvPr>
+        </p:nvSpPr>
+        <p:spPr/>
+        <p:txBody>
+          <a:bodyPr>
+            <a:normAutofit fontScale="92500" lnSpcReduction="10000"/>
+          </a:bodyPr>
+          <a:lstStyle/>
+          <a:p>
+            <a:pPr>
+              <a:lnSpc>
+                <a:spcPct val="150000"/>
+              </a:lnSpc>
+            </a:pPr>
+            <a:r>
+              <a:rPr lang="ko-KR" altLang="en-US" dirty="0"/>
+              <a:t>테스트 환경</a:t>
+            </a:r>
+            <a:r>
+              <a:rPr lang="en-US" altLang="ko-KR" dirty="0"/>
+              <a:t>: </a:t>
+            </a:r>
+            <a:r>
+              <a:rPr lang="ko-KR" altLang="en-US" dirty="0" err="1"/>
+              <a:t>인메모리</a:t>
+            </a:r>
+            <a:r>
+              <a:rPr lang="ko-KR" altLang="en-US" dirty="0"/>
+              <a:t> 모드는 테스트 환경에서 데이터베이스를 임시로 사용하는 데 유용하다</a:t>
+            </a:r>
+            <a:r>
+              <a:rPr lang="en-US" altLang="ko-KR" dirty="0"/>
+              <a:t>. </a:t>
+            </a:r>
+            <a:r>
+              <a:rPr lang="ko-KR" altLang="en-US" dirty="0"/>
+              <a:t>테스트를 위해 별도의 데이터베이스를 설치하거나 구성할 필요 없이 메모리에서 데이터를 처리할 수 있다</a:t>
+            </a:r>
+            <a:r>
+              <a:rPr lang="en-US" altLang="ko-KR" dirty="0"/>
+              <a:t>.</a:t>
+            </a:r>
+          </a:p>
+          <a:p>
+            <a:pPr>
+              <a:lnSpc>
+                <a:spcPct val="150000"/>
+              </a:lnSpc>
+            </a:pPr>
+            <a:r>
+              <a:rPr lang="ko-KR" altLang="en-US" dirty="0"/>
+              <a:t>성능</a:t>
+            </a:r>
+            <a:r>
+              <a:rPr lang="en-US" altLang="ko-KR" dirty="0"/>
+              <a:t>: </a:t>
+            </a:r>
+            <a:r>
+              <a:rPr lang="ko-KR" altLang="en-US" dirty="0"/>
+              <a:t>디스크에 데이터를 저장하는 것보다 메모리에서 데이터를 처리하므로</a:t>
+            </a:r>
+            <a:r>
+              <a:rPr lang="en-US" altLang="ko-KR" dirty="0"/>
+              <a:t>, I/O </a:t>
+            </a:r>
+            <a:r>
+              <a:rPr lang="ko-KR" altLang="en-US" dirty="0"/>
+              <a:t>비용이 절약되고 더 빠른 성능을 제공할 수 있다</a:t>
+            </a:r>
+            <a:r>
+              <a:rPr lang="en-US" altLang="ko-KR" dirty="0"/>
+              <a:t>.</a:t>
+            </a:r>
+          </a:p>
+          <a:p>
+            <a:pPr>
+              <a:lnSpc>
+                <a:spcPct val="150000"/>
+              </a:lnSpc>
+            </a:pPr>
+            <a:r>
+              <a:rPr lang="ko-KR" altLang="en-US" dirty="0"/>
+              <a:t>임시 데이터</a:t>
+            </a:r>
+            <a:r>
+              <a:rPr lang="en-US" altLang="ko-KR" dirty="0"/>
+              <a:t>: </a:t>
+            </a:r>
+            <a:r>
+              <a:rPr lang="ko-KR" altLang="en-US" dirty="0"/>
+              <a:t>임시로 생성되는 데이터나 세션 관리와 같이 영구 저장이 필요하지 않은 데이터를 처리할 때 편리하다</a:t>
+            </a:r>
+            <a:r>
+              <a:rPr lang="en-US" altLang="ko-KR" dirty="0"/>
+              <a:t>.</a:t>
+            </a:r>
+            <a:endParaRPr lang="ko-KR" altLang="en-US" dirty="0"/>
+          </a:p>
+        </p:txBody>
+      </p:sp>
+    </p:spTree>
+    <p:extLst>
+      <p:ext uri="{BB962C8B-B14F-4D97-AF65-F5344CB8AC3E}">
+        <p14:creationId xmlns:p14="http://schemas.microsoft.com/office/powerpoint/2010/main" val="1688660583"/>
+      </p:ext>
+    </p:extLst>
+  </p:cSld>
+  <p:clrMapOvr>
+    <a:masterClrMapping/>
+  </p:clrMapOvr>
+  <p:timing>
+    <p:tnLst>
+      <p:par>
+        <p:cTn id="1" dur="indefinite" restart="never" nodeType="tmRoot"/>
+      </p:par>
+    </p:tnLst>
+  </p:timing>
+</p:sld>
+</file>
+
+<file path=ppt/slides/slide23.xml><?xml version="1.0" encoding="utf-8"?>
+<p:sld xmlns:a="http://schemas.openxmlformats.org/drawingml/2006/main" xmlns:r="http://schemas.openxmlformats.org/officeDocument/2006/relationships" xmlns:p="http://schemas.openxmlformats.org/presentationml/2006/main">
+  <p:cSld>
+    <p:spTree>
+      <p:nvGrpSpPr>
+        <p:cNvPr id="1" name=""/>
+        <p:cNvGrpSpPr/>
+        <p:nvPr/>
+      </p:nvGrpSpPr>
+      <p:grpSpPr>
+        <a:xfrm>
+          <a:off x="0" y="0"/>
+          <a:ext cx="0" cy="0"/>
+          <a:chOff x="0" y="0"/>
+          <a:chExt cx="0" cy="0"/>
+        </a:xfrm>
+      </p:grpSpPr>
+      <p:sp>
+        <p:nvSpPr>
+          <p:cNvPr id="2" name="제목 1"/>
+          <p:cNvSpPr>
+            <a:spLocks noGrp="1"/>
+          </p:cNvSpPr>
+          <p:nvPr>
+            <p:ph type="title"/>
+          </p:nvPr>
+        </p:nvSpPr>
+        <p:spPr/>
+        <p:txBody>
+          <a:bodyPr/>
+          <a:lstStyle/>
+          <a:p>
+            <a:r>
+              <a:rPr lang="en-US" altLang="ko-KR" dirty="0"/>
+              <a:t>H2 In-Memory </a:t>
+            </a:r>
+            <a:r>
+              <a:rPr lang="en-US" altLang="ko-KR" dirty="0" smtClean="0"/>
+              <a:t>Mode </a:t>
+            </a:r>
+            <a:r>
+              <a:rPr lang="ko-KR" altLang="en-US" dirty="0" smtClean="0"/>
+              <a:t>단점</a:t>
+            </a:r>
+            <a:endParaRPr lang="ko-KR" altLang="en-US" dirty="0"/>
+          </a:p>
+        </p:txBody>
+      </p:sp>
+      <p:sp>
+        <p:nvSpPr>
+          <p:cNvPr id="3" name="내용 개체 틀 2"/>
+          <p:cNvSpPr>
+            <a:spLocks noGrp="1"/>
+          </p:cNvSpPr>
+          <p:nvPr>
+            <p:ph idx="1"/>
+          </p:nvPr>
+        </p:nvSpPr>
+        <p:spPr/>
+        <p:txBody>
+          <a:bodyPr/>
+          <a:lstStyle/>
+          <a:p>
+            <a:pPr>
+              <a:lnSpc>
+                <a:spcPct val="200000"/>
+              </a:lnSpc>
+            </a:pPr>
+            <a:r>
+              <a:rPr lang="ko-KR" altLang="en-US" dirty="0" err="1"/>
+              <a:t>인메모리</a:t>
+            </a:r>
+            <a:r>
+              <a:rPr lang="ko-KR" altLang="en-US" dirty="0"/>
+              <a:t> 모드는 임시 데이터 처리나 테스트 환경에서 유용한 기능을 제공한다</a:t>
+            </a:r>
+            <a:r>
+              <a:rPr lang="en-US" altLang="ko-KR" dirty="0"/>
+              <a:t>. </a:t>
+            </a:r>
+            <a:r>
+              <a:rPr lang="ko-KR" altLang="en-US" dirty="0"/>
+              <a:t>그러나 주의해야 할 점은 데이터가 메모리에만 저장되기 때문에 서버를 재시작하거나 연결이 종료되면 데이터가 모두 사라진다는 점이다</a:t>
+            </a:r>
+            <a:r>
+              <a:rPr lang="en-US" altLang="ko-KR" dirty="0"/>
+              <a:t>.</a:t>
+            </a:r>
+            <a:endParaRPr lang="ko-KR" altLang="en-US" dirty="0"/>
+          </a:p>
+        </p:txBody>
+      </p:sp>
+    </p:spTree>
+    <p:extLst>
+      <p:ext uri="{BB962C8B-B14F-4D97-AF65-F5344CB8AC3E}">
+        <p14:creationId xmlns:p14="http://schemas.microsoft.com/office/powerpoint/2010/main" val="297249293"/>
+      </p:ext>
+    </p:extLst>
+  </p:cSld>
+  <p:clrMapOvr>
+    <a:masterClrMapping/>
+  </p:clrMapOvr>
+</p:sld>
+</file>
+
+<file path=ppt/slides/slide3.xml><?xml version="1.0" encoding="utf-8"?>
+<p:sld xmlns:a="http://schemas.openxmlformats.org/drawingml/2006/main" xmlns:r="http://schemas.openxmlformats.org/officeDocument/2006/relationships" xmlns:p="http://schemas.openxmlformats.org/presentationml/2006/main">
+  <p:cSld>
+    <p:spTree>
+      <p:nvGrpSpPr>
+        <p:cNvPr id="1" name=""/>
+        <p:cNvGrpSpPr/>
+        <p:nvPr/>
+      </p:nvGrpSpPr>
+      <p:grpSpPr>
+        <a:xfrm>
+          <a:off x="0" y="0"/>
+          <a:ext cx="0" cy="0"/>
+          <a:chOff x="0" y="0"/>
+          <a:chExt cx="0" cy="0"/>
+        </a:xfrm>
+      </p:grpSpPr>
+      <p:sp>
+        <p:nvSpPr>
+          <p:cNvPr id="2" name="제목 1"/>
+          <p:cNvSpPr>
+            <a:spLocks noGrp="1"/>
+          </p:cNvSpPr>
+          <p:nvPr>
+            <p:ph type="title"/>
+          </p:nvPr>
+        </p:nvSpPr>
+        <p:spPr/>
+        <p:txBody>
+          <a:bodyPr/>
+          <a:lstStyle/>
+          <a:p>
+            <a:r>
               <a:rPr lang="ko-KR" altLang="en-US" dirty="0" err="1" smtClean="0"/>
               <a:t>엔티티</a:t>
             </a:r>
             <a:r>
               <a:rPr lang="ko-KR" altLang="en-US" dirty="0" smtClean="0"/>
-              <a:t> 매니저</a:t>
-            </a:r>
-            <a:r>
-              <a:rPr lang="ko-KR" altLang="en-US" dirty="0" smtClean="0"/>
-              <a:t>와 </a:t>
+              <a:t> 매니저와 </a:t>
             </a:r>
             <a:r>
               <a:rPr lang="ko-KR" altLang="en-US" dirty="0" err="1" smtClean="0"/>
@@ -3185,7 +5838,7 @@
 </p:sld>
 </file>
 
-<file path=ppt/slides/slide3.xml><?xml version="1.0" encoding="utf-8"?>
+<file path=ppt/slides/slide4.xml><?xml version="1.0" encoding="utf-8"?>
 <p:sld xmlns:a="http://schemas.openxmlformats.org/drawingml/2006/main" xmlns:r="http://schemas.openxmlformats.org/officeDocument/2006/relationships" xmlns:p="http://schemas.openxmlformats.org/presentationml/2006/main">
   <p:cSld>
     <p:spTree>
@@ -3379,7 +6032,7 @@
 </p:sld>
 </file>
 
-<file path=ppt/slides/slide4.xml><?xml version="1.0" encoding="utf-8"?>
+<file path=ppt/slides/slide5.xml><?xml version="1.0" encoding="utf-8"?>
 <p:sld xmlns:a="http://schemas.openxmlformats.org/drawingml/2006/main" xmlns:r="http://schemas.openxmlformats.org/officeDocument/2006/relationships" xmlns:p="http://schemas.openxmlformats.org/presentationml/2006/main">
   <p:cSld>
     <p:spTree>
@@ -3542,7 +6195,7 @@
 </p:sld>
 </file>
 
-<file path=ppt/slides/slide5.xml><?xml version="1.0" encoding="utf-8"?>
+<file path=ppt/slides/slide6.xml><?xml version="1.0" encoding="utf-8"?>
 <p:sld xmlns:a="http://schemas.openxmlformats.org/drawingml/2006/main" xmlns:r="http://schemas.openxmlformats.org/officeDocument/2006/relationships" xmlns:p="http://schemas.openxmlformats.org/presentationml/2006/main">
   <p:cSld>
     <p:spTree>
@@ -3585,25 +6238,32 @@
           </a:p>
         </p:txBody>
       </p:sp>
-      <p:sp>
-        <p:nvSpPr>
-          <p:cNvPr id="3" name="내용 개체 틀 2"/>
-          <p:cNvSpPr>
-            <a:spLocks noGrp="1"/>
-          </p:cNvSpPr>
+      <p:pic>
+        <p:nvPicPr>
+          <p:cNvPr id="5" name="내용 개체 틀 4"/>
+          <p:cNvPicPr>
+            <a:picLocks noGrp="1" noChangeAspect="1"/>
+          </p:cNvPicPr>
           <p:nvPr>
             <p:ph idx="1"/>
           </p:nvPr>
-        </p:nvSpPr>
-        <p:spPr/>
-        <p:txBody>
-          <a:bodyPr/>
-          <a:lstStyle/>
-          <a:p>
-            <a:endParaRPr lang="ko-KR" altLang="en-US" dirty="0"/>
-          </a:p>
-        </p:txBody>
-      </p:sp>
+        </p:nvPicPr>
+        <p:blipFill>
+          <a:blip r:embed="rId2"/>
+          <a:stretch>
+            <a:fillRect/>
+          </a:stretch>
+        </p:blipFill>
+        <p:spPr>
+          <a:xfrm>
+            <a:off x="2631141" y="1419786"/>
+            <a:ext cx="6929718" cy="5001265"/>
+          </a:xfrm>
+          <a:prstGeom prst="rect">
+            <a:avLst/>
+          </a:prstGeom>
+        </p:spPr>
+      </p:pic>
     </p:spTree>
     <p:extLst>
       <p:ext uri="{BB962C8B-B14F-4D97-AF65-F5344CB8AC3E}">
@@ -3614,6 +6274,500 @@
   <p:clrMapOvr>
     <a:masterClrMapping/>
   </p:clrMapOvr>
+  <p:timing>
+    <p:tnLst>
+      <p:par>
+        <p:cTn id="1" dur="indefinite" restart="never" nodeType="tmRoot"/>
+      </p:par>
+    </p:tnLst>
+  </p:timing>
+</p:sld>
+</file>
+
+<file path=ppt/slides/slide7.xml><?xml version="1.0" encoding="utf-8"?>
+<p:sld xmlns:a="http://schemas.openxmlformats.org/drawingml/2006/main" xmlns:r="http://schemas.openxmlformats.org/officeDocument/2006/relationships" xmlns:p="http://schemas.openxmlformats.org/presentationml/2006/main">
+  <p:cSld>
+    <p:spTree>
+      <p:nvGrpSpPr>
+        <p:cNvPr id="1" name=""/>
+        <p:cNvGrpSpPr/>
+        <p:nvPr/>
+      </p:nvGrpSpPr>
+      <p:grpSpPr>
+        <a:xfrm>
+          <a:off x="0" y="0"/>
+          <a:ext cx="0" cy="0"/>
+          <a:chOff x="0" y="0"/>
+          <a:chExt cx="0" cy="0"/>
+        </a:xfrm>
+      </p:grpSpPr>
+      <p:sp>
+        <p:nvSpPr>
+          <p:cNvPr id="2" name="제목 1"/>
+          <p:cNvSpPr>
+            <a:spLocks noGrp="1"/>
+          </p:cNvSpPr>
+          <p:nvPr>
+            <p:ph type="title"/>
+          </p:nvPr>
+        </p:nvSpPr>
+        <p:spPr/>
+        <p:txBody>
+          <a:bodyPr/>
+          <a:lstStyle/>
+          <a:p>
+            <a:r>
+              <a:rPr lang="en-US" altLang="ko-KR" dirty="0" smtClean="0"/>
+              <a:t>Spring data</a:t>
+            </a:r>
+            <a:r>
+              <a:rPr lang="ko-KR" altLang="en-US" dirty="0" smtClean="0"/>
+              <a:t> </a:t>
+            </a:r>
+            <a:r>
+              <a:rPr lang="en-US" altLang="ko-KR" dirty="0" smtClean="0"/>
+              <a:t>JPA </a:t>
+            </a:r>
+            <a:r>
+              <a:rPr lang="ko-KR" altLang="en-US" dirty="0" smtClean="0"/>
+              <a:t>프레임워크</a:t>
+            </a:r>
+            <a:endParaRPr lang="ko-KR" altLang="en-US" dirty="0"/>
+          </a:p>
+        </p:txBody>
+      </p:sp>
+      <p:pic>
+        <p:nvPicPr>
+          <p:cNvPr id="4" name="내용 개체 틀 3"/>
+          <p:cNvPicPr>
+            <a:picLocks noGrp="1" noChangeAspect="1"/>
+          </p:cNvPicPr>
+          <p:nvPr>
+            <p:ph idx="1"/>
+          </p:nvPr>
+        </p:nvPicPr>
+        <p:blipFill>
+          <a:blip r:embed="rId2"/>
+          <a:stretch>
+            <a:fillRect/>
+          </a:stretch>
+        </p:blipFill>
+        <p:spPr>
+          <a:xfrm>
+            <a:off x="3964358" y="1852520"/>
+            <a:ext cx="4263283" cy="4351338"/>
+          </a:xfrm>
+          <a:prstGeom prst="rect">
+            <a:avLst/>
+          </a:prstGeom>
+        </p:spPr>
+      </p:pic>
+    </p:spTree>
+    <p:extLst>
+      <p:ext uri="{BB962C8B-B14F-4D97-AF65-F5344CB8AC3E}">
+        <p14:creationId xmlns:p14="http://schemas.microsoft.com/office/powerpoint/2010/main" val="466901465"/>
+      </p:ext>
+    </p:extLst>
+  </p:cSld>
+  <p:clrMapOvr>
+    <a:masterClrMapping/>
+  </p:clrMapOvr>
+  <p:timing>
+    <p:tnLst>
+      <p:par>
+        <p:cTn id="1" dur="indefinite" restart="never" nodeType="tmRoot"/>
+      </p:par>
+    </p:tnLst>
+  </p:timing>
+</p:sld>
+</file>
+
+<file path=ppt/slides/slide8.xml><?xml version="1.0" encoding="utf-8"?>
+<p:sld xmlns:a="http://schemas.openxmlformats.org/drawingml/2006/main" xmlns:r="http://schemas.openxmlformats.org/officeDocument/2006/relationships" xmlns:p="http://schemas.openxmlformats.org/presentationml/2006/main">
+  <p:cSld>
+    <p:spTree>
+      <p:nvGrpSpPr>
+        <p:cNvPr id="1" name=""/>
+        <p:cNvGrpSpPr/>
+        <p:nvPr/>
+      </p:nvGrpSpPr>
+      <p:grpSpPr>
+        <a:xfrm>
+          <a:off x="0" y="0"/>
+          <a:ext cx="0" cy="0"/>
+          <a:chOff x="0" y="0"/>
+          <a:chExt cx="0" cy="0"/>
+        </a:xfrm>
+      </p:grpSpPr>
+      <p:sp>
+        <p:nvSpPr>
+          <p:cNvPr id="2" name="제목 1"/>
+          <p:cNvSpPr>
+            <a:spLocks noGrp="1"/>
+          </p:cNvSpPr>
+          <p:nvPr>
+            <p:ph type="title"/>
+          </p:nvPr>
+        </p:nvSpPr>
+        <p:spPr/>
+        <p:txBody>
+          <a:bodyPr/>
+          <a:lstStyle/>
+          <a:p>
+            <a:r>
+              <a:rPr lang="en-US" altLang="ko-KR" dirty="0"/>
+              <a:t>@Query </a:t>
+            </a:r>
+            <a:r>
+              <a:rPr lang="ko-KR" altLang="en-US" dirty="0" smtClean="0"/>
+              <a:t>사용법</a:t>
+            </a:r>
+            <a:r>
+              <a:rPr lang="en-US" altLang="ko-KR" dirty="0" smtClean="0"/>
+              <a:t>1: </a:t>
+            </a:r>
+            <a:r>
+              <a:rPr lang="en-US" altLang="ko-KR" dirty="0"/>
+              <a:t>JPQL</a:t>
+            </a:r>
+            <a:r>
+              <a:rPr lang="ko-KR" altLang="en-US" dirty="0"/>
+              <a:t>로 작성하는 </a:t>
+            </a:r>
+            <a:r>
+              <a:rPr lang="ko-KR" altLang="en-US" dirty="0" smtClean="0"/>
+              <a:t>방법</a:t>
+            </a:r>
+            <a:endParaRPr lang="ko-KR" altLang="en-US" dirty="0"/>
+          </a:p>
+        </p:txBody>
+      </p:sp>
+      <p:sp>
+        <p:nvSpPr>
+          <p:cNvPr id="3" name="내용 개체 틀 2"/>
+          <p:cNvSpPr>
+            <a:spLocks noGrp="1"/>
+          </p:cNvSpPr>
+          <p:nvPr>
+            <p:ph idx="1"/>
+          </p:nvPr>
+        </p:nvSpPr>
+        <p:spPr/>
+        <p:txBody>
+          <a:bodyPr/>
+          <a:lstStyle/>
+          <a:p>
+            <a:pPr>
+              <a:lnSpc>
+                <a:spcPct val="150000"/>
+              </a:lnSpc>
+            </a:pPr>
+            <a:r>
+              <a:rPr lang="en-US" altLang="ko-KR" dirty="0"/>
+              <a:t>@Query </a:t>
+            </a:r>
+            <a:r>
+              <a:rPr lang="ko-KR" altLang="en-US" dirty="0"/>
+              <a:t>안에 </a:t>
+            </a:r>
+            <a:r>
+              <a:rPr lang="en-US" altLang="ko-KR" dirty="0"/>
+              <a:t>JPQL</a:t>
+            </a:r>
+            <a:r>
+              <a:rPr lang="ko-KR" altLang="en-US" dirty="0"/>
+              <a:t>로 작성하는 방식이다</a:t>
+            </a:r>
+            <a:r>
+              <a:rPr lang="en-US" altLang="ko-KR" dirty="0" smtClean="0"/>
+              <a:t>.</a:t>
+            </a:r>
+          </a:p>
+          <a:p>
+            <a:pPr>
+              <a:lnSpc>
+                <a:spcPct val="150000"/>
+              </a:lnSpc>
+            </a:pPr>
+            <a:r>
+              <a:rPr lang="en-US" altLang="ko-KR" dirty="0" smtClean="0"/>
+              <a:t>:</a:t>
+            </a:r>
+            <a:r>
+              <a:rPr lang="en-US" altLang="ko-KR" dirty="0"/>
+              <a:t>name</a:t>
+            </a:r>
+            <a:r>
+              <a:rPr lang="ko-KR" altLang="en-US" dirty="0"/>
+              <a:t>은 </a:t>
+            </a:r>
+            <a:r>
+              <a:rPr lang="ko-KR" altLang="en-US" dirty="0" err="1"/>
+              <a:t>파라미터</a:t>
+            </a:r>
+            <a:r>
+              <a:rPr lang="ko-KR" altLang="en-US" dirty="0"/>
+              <a:t> 바인딩</a:t>
+            </a:r>
+            <a:r>
+              <a:rPr lang="en-US" altLang="ko-KR" dirty="0"/>
+              <a:t>(</a:t>
+            </a:r>
+            <a:r>
+              <a:rPr lang="ko-KR" altLang="en-US" dirty="0"/>
+              <a:t>값을 전달할 자리</a:t>
+            </a:r>
+            <a:r>
+              <a:rPr lang="en-US" altLang="ko-KR" dirty="0"/>
+              <a:t>)</a:t>
+            </a:r>
+            <a:r>
+              <a:rPr lang="ko-KR" altLang="en-US" dirty="0"/>
+              <a:t>하고 </a:t>
+            </a:r>
+            <a:r>
+              <a:rPr lang="en-US" altLang="ko-KR" dirty="0"/>
+              <a:t>@</a:t>
+            </a:r>
+            <a:r>
+              <a:rPr lang="en-US" altLang="ko-KR" dirty="0" err="1"/>
+              <a:t>Param</a:t>
+            </a:r>
+            <a:r>
+              <a:rPr lang="ko-KR" altLang="en-US" dirty="0"/>
+              <a:t>으로 메서드 매개변수와 쿼리의 </a:t>
+            </a:r>
+            <a:r>
+              <a:rPr lang="ko-KR" altLang="en-US" dirty="0" err="1"/>
+              <a:t>파라미터를</a:t>
+            </a:r>
+            <a:r>
+              <a:rPr lang="ko-KR" altLang="en-US" dirty="0"/>
+              <a:t> </a:t>
+            </a:r>
+            <a:r>
+              <a:rPr lang="ko-KR" altLang="en-US" dirty="0" smtClean="0"/>
+              <a:t>연결한다</a:t>
+            </a:r>
+            <a:r>
+              <a:rPr lang="en-US" altLang="ko-KR" dirty="0"/>
+              <a:t>.</a:t>
+            </a:r>
+            <a:endParaRPr lang="ko-KR" altLang="en-US" dirty="0"/>
+          </a:p>
+        </p:txBody>
+      </p:sp>
+      <p:pic>
+        <p:nvPicPr>
+          <p:cNvPr id="5" name="그림 4"/>
+          <p:cNvPicPr>
+            <a:picLocks noChangeAspect="1"/>
+          </p:cNvPicPr>
+          <p:nvPr/>
+        </p:nvPicPr>
+        <p:blipFill>
+          <a:blip r:embed="rId2"/>
+          <a:stretch>
+            <a:fillRect/>
+          </a:stretch>
+        </p:blipFill>
+        <p:spPr>
+          <a:xfrm>
+            <a:off x="1852020" y="4001294"/>
+            <a:ext cx="8487960" cy="1933845"/>
+          </a:xfrm>
+          <a:prstGeom prst="rect">
+            <a:avLst/>
+          </a:prstGeom>
+        </p:spPr>
+      </p:pic>
+    </p:spTree>
+    <p:extLst>
+      <p:ext uri="{BB962C8B-B14F-4D97-AF65-F5344CB8AC3E}">
+        <p14:creationId xmlns:p14="http://schemas.microsoft.com/office/powerpoint/2010/main" val="2022185023"/>
+      </p:ext>
+    </p:extLst>
+  </p:cSld>
+  <p:clrMapOvr>
+    <a:masterClrMapping/>
+  </p:clrMapOvr>
+  <p:timing>
+    <p:tnLst>
+      <p:par>
+        <p:cTn id="1" dur="indefinite" restart="never" nodeType="tmRoot"/>
+      </p:par>
+    </p:tnLst>
+  </p:timing>
+</p:sld>
+</file>
+
+<file path=ppt/slides/slide9.xml><?xml version="1.0" encoding="utf-8"?>
+<p:sld xmlns:a="http://schemas.openxmlformats.org/drawingml/2006/main" xmlns:r="http://schemas.openxmlformats.org/officeDocument/2006/relationships" xmlns:p="http://schemas.openxmlformats.org/presentationml/2006/main">
+  <p:cSld>
+    <p:spTree>
+      <p:nvGrpSpPr>
+        <p:cNvPr id="1" name=""/>
+        <p:cNvGrpSpPr/>
+        <p:nvPr/>
+      </p:nvGrpSpPr>
+      <p:grpSpPr>
+        <a:xfrm>
+          <a:off x="0" y="0"/>
+          <a:ext cx="0" cy="0"/>
+          <a:chOff x="0" y="0"/>
+          <a:chExt cx="0" cy="0"/>
+        </a:xfrm>
+      </p:grpSpPr>
+      <p:sp>
+        <p:nvSpPr>
+          <p:cNvPr id="2" name="제목 1"/>
+          <p:cNvSpPr>
+            <a:spLocks noGrp="1"/>
+          </p:cNvSpPr>
+          <p:nvPr>
+            <p:ph type="title"/>
+          </p:nvPr>
+        </p:nvSpPr>
+        <p:spPr/>
+        <p:txBody>
+          <a:bodyPr>
+            <a:normAutofit/>
+          </a:bodyPr>
+          <a:lstStyle/>
+          <a:p>
+            <a:r>
+              <a:rPr lang="en-US" altLang="ko-KR" dirty="0"/>
+              <a:t>@Query </a:t>
+            </a:r>
+            <a:r>
+              <a:rPr lang="ko-KR" altLang="en-US" dirty="0"/>
+              <a:t>사용 방법 </a:t>
+            </a:r>
+            <a:r>
+              <a:rPr lang="en-US" altLang="ko-KR" dirty="0"/>
+              <a:t>2, Native Query (SQL</a:t>
+            </a:r>
+            <a:r>
+              <a:rPr lang="en-US" altLang="ko-KR" dirty="0" smtClean="0"/>
+              <a:t>)</a:t>
+            </a:r>
+            <a:endParaRPr lang="ko-KR" altLang="en-US" dirty="0"/>
+          </a:p>
+        </p:txBody>
+      </p:sp>
+      <p:sp>
+        <p:nvSpPr>
+          <p:cNvPr id="3" name="내용 개체 틀 2"/>
+          <p:cNvSpPr>
+            <a:spLocks noGrp="1"/>
+          </p:cNvSpPr>
+          <p:nvPr>
+            <p:ph idx="1"/>
+          </p:nvPr>
+        </p:nvSpPr>
+        <p:spPr/>
+        <p:txBody>
+          <a:bodyPr/>
+          <a:lstStyle/>
+          <a:p>
+            <a:pPr>
+              <a:lnSpc>
+                <a:spcPct val="150000"/>
+              </a:lnSpc>
+            </a:pPr>
+            <a:r>
+              <a:rPr lang="en-US" altLang="ko-KR" dirty="0" err="1"/>
+              <a:t>nativeQuery</a:t>
+            </a:r>
+            <a:r>
+              <a:rPr lang="en-US" altLang="ko-KR" dirty="0"/>
+              <a:t> = true</a:t>
+            </a:r>
+            <a:r>
+              <a:rPr lang="ko-KR" altLang="en-US" dirty="0"/>
+              <a:t>를 추가하면 </a:t>
+            </a:r>
+            <a:r>
+              <a:rPr lang="en-US" altLang="ko-KR" dirty="0"/>
+              <a:t>SQL</a:t>
+            </a:r>
+            <a:r>
+              <a:rPr lang="ko-KR" altLang="en-US" dirty="0"/>
+              <a:t>을 그대로 사용할 수 있다</a:t>
+            </a:r>
+            <a:r>
+              <a:rPr lang="en-US" altLang="ko-KR" dirty="0"/>
+              <a:t>.</a:t>
+            </a:r>
+            <a:r>
+              <a:rPr lang="ko-KR" altLang="en-US" dirty="0"/>
+              <a:t>주의할 점은 테이블 이름과 </a:t>
+            </a:r>
+            <a:r>
+              <a:rPr lang="ko-KR" altLang="en-US" dirty="0" err="1"/>
+              <a:t>컬럼명이</a:t>
+            </a:r>
+            <a:r>
+              <a:rPr lang="ko-KR" altLang="en-US" dirty="0"/>
+              <a:t> </a:t>
+            </a:r>
+            <a:r>
+              <a:rPr lang="en-US" altLang="ko-KR" dirty="0"/>
+              <a:t>DB</a:t>
+            </a:r>
+            <a:r>
+              <a:rPr lang="ko-KR" altLang="en-US" dirty="0"/>
+              <a:t>에 실제 존재하는 이름이어야 한다</a:t>
+            </a:r>
+            <a:r>
+              <a:rPr lang="en-US" altLang="ko-KR" dirty="0" smtClean="0"/>
+              <a:t>.</a:t>
+            </a:r>
+            <a:endParaRPr lang="ko-KR" altLang="en-US" dirty="0"/>
+          </a:p>
+        </p:txBody>
+      </p:sp>
+      <p:pic>
+        <p:nvPicPr>
+          <p:cNvPr id="4" name="그림 3"/>
+          <p:cNvPicPr>
+            <a:picLocks noChangeAspect="1"/>
+          </p:cNvPicPr>
+          <p:nvPr/>
+        </p:nvPicPr>
+        <p:blipFill>
+          <a:blip r:embed="rId2"/>
+          <a:stretch>
+            <a:fillRect/>
+          </a:stretch>
+        </p:blipFill>
+        <p:spPr>
+          <a:xfrm>
+            <a:off x="1656730" y="4001294"/>
+            <a:ext cx="8878539" cy="1238423"/>
+          </a:xfrm>
+          <a:prstGeom prst="rect">
+            <a:avLst/>
+          </a:prstGeom>
+        </p:spPr>
+      </p:pic>
+    </p:spTree>
+    <p:extLst>
+      <p:ext uri="{BB962C8B-B14F-4D97-AF65-F5344CB8AC3E}">
+        <p14:creationId xmlns:p14="http://schemas.microsoft.com/office/powerpoint/2010/main" val="261004277"/>
+      </p:ext>
+    </p:extLst>
+  </p:cSld>
+  <p:clrMapOvr>
+    <a:masterClrMapping/>
+  </p:clrMapOvr>
+  <p:timing>
+    <p:tnLst>
+      <p:par>
+        <p:cTn id="1" dur="indefinite" restart="never" nodeType="tmRoot"/>
+      </p:par>
+    </p:tnLst>
+  </p:timing>
 </p:sld>
 </file>
 

</xml_diff>